<commit_message>
Update: factory management system
</commit_message>
<xml_diff>
--- a/evaluation/공장 관리 시스템.pptx
+++ b/evaluation/공장 관리 시스템.pptx
@@ -8,12 +8,13 @@
     <p:sldId id="256" r:id="rId2"/>
     <p:sldId id="257" r:id="rId3"/>
     <p:sldId id="258" r:id="rId4"/>
-    <p:sldId id="259" r:id="rId5"/>
-    <p:sldId id="260" r:id="rId6"/>
-    <p:sldId id="261" r:id="rId7"/>
-    <p:sldId id="263" r:id="rId8"/>
-    <p:sldId id="262" r:id="rId9"/>
-    <p:sldId id="264" r:id="rId10"/>
+    <p:sldId id="266" r:id="rId5"/>
+    <p:sldId id="265" r:id="rId6"/>
+    <p:sldId id="260" r:id="rId7"/>
+    <p:sldId id="261" r:id="rId8"/>
+    <p:sldId id="263" r:id="rId9"/>
+    <p:sldId id="262" r:id="rId10"/>
+    <p:sldId id="264" r:id="rId11"/>
   </p:sldIdLst>
   <p:sldSz cx="12192000" cy="6858000"/>
   <p:notesSz cx="6858000" cy="9144000"/>
@@ -112,6 +113,11 @@
       </a:defRPr>
     </a:lvl9pPr>
   </p:defaultTextStyle>
+  <p:extLst>
+    <p:ext uri="{EFAFB233-063F-42B5-8137-9DF3F51BA10A}">
+      <p15:sldGuideLst xmlns:p15="http://schemas.microsoft.com/office/powerpoint/2012/main"/>
+    </p:ext>
+  </p:extLst>
 </p:presentation>
 </file>
 
@@ -926,14 +932,14 @@
         <a:p>
           <a:pPr latinLnBrk="1"/>
           <a:r>
-            <a:rPr lang="en-US" altLang="ko-KR" sz="2000" b="0" smtClean="0">
+            <a:rPr lang="en-US" altLang="ko-KR" sz="1600" b="0" smtClean="0">
               <a:solidFill>
                 <a:srgbClr val="0070C0"/>
               </a:solidFill>
             </a:rPr>
             <a:t>deviceworkingTB</a:t>
           </a:r>
-          <a:endParaRPr lang="en-US" altLang="ko-KR" sz="1800" b="0" dirty="0" smtClean="0">
+          <a:endParaRPr lang="en-US" altLang="ko-KR" sz="1400" b="0" dirty="0" smtClean="0">
             <a:solidFill>
               <a:srgbClr val="0070C0"/>
             </a:solidFill>
@@ -966,7 +972,7 @@
       </dgm:t>
     </dgm:pt>
     <dgm:pt modelId="{7D4198FD-EEB3-4150-B740-EF990199F6E0}">
-      <dgm:prSet/>
+      <dgm:prSet custT="1"/>
       <dgm:spPr/>
       <dgm:t>
         <a:bodyPr/>
@@ -974,10 +980,10 @@
         <a:p>
           <a:pPr latinLnBrk="1"/>
           <a:r>
-            <a:rPr lang="en-US" altLang="ko-KR" sz="1700" smtClean="0"/>
+            <a:rPr lang="en-US" altLang="ko-KR" sz="1400" smtClean="0"/>
             <a:t>No(PK, NN, AI, INT), LineNo(NN, VARCHAR), DeviceName(NN, VARCHAR)</a:t>
           </a:r>
-          <a:endParaRPr lang="en-US" altLang="ko-KR" sz="1700" dirty="0" smtClean="0"/>
+          <a:endParaRPr lang="en-US" altLang="ko-KR" sz="1400" dirty="0" smtClean="0"/>
         </a:p>
       </dgm:t>
     </dgm:pt>
@@ -1006,7 +1012,7 @@
       </dgm:t>
     </dgm:pt>
     <dgm:pt modelId="{E45374C0-7364-4850-9FB1-8F9CDE8E4F5B}">
-      <dgm:prSet/>
+      <dgm:prSet custT="1"/>
       <dgm:spPr/>
       <dgm:t>
         <a:bodyPr/>
@@ -1014,10 +1020,21 @@
         <a:p>
           <a:pPr latinLnBrk="1"/>
           <a:r>
-            <a:rPr lang="en-US" altLang="ko-KR" sz="1700" smtClean="0"/>
-            <a:t>StartTime(DATETIME), EndTime(DATETIME), Status(VARCHAR)</a:t>
+            <a:rPr lang="en-US" altLang="ko-KR" sz="1400" dirty="0" err="1" smtClean="0"/>
+            <a:t>StartTime</a:t>
           </a:r>
-          <a:endParaRPr lang="en-US" altLang="ko-KR" sz="1700" dirty="0" smtClean="0"/>
+          <a:r>
+            <a:rPr lang="en-US" altLang="ko-KR" sz="1400" dirty="0" smtClean="0"/>
+            <a:t>(DATETIME), </a:t>
+          </a:r>
+          <a:r>
+            <a:rPr lang="en-US" altLang="ko-KR" sz="1400" dirty="0" err="1" smtClean="0"/>
+            <a:t>EndTime</a:t>
+          </a:r>
+          <a:r>
+            <a:rPr lang="en-US" altLang="ko-KR" sz="1400" dirty="0" smtClean="0"/>
+            <a:t>(DATETIME), Status(VARCHAR)</a:t>
+          </a:r>
         </a:p>
       </dgm:t>
     </dgm:pt>
@@ -1054,14 +1071,14 @@
         <a:p>
           <a:pPr latinLnBrk="1"/>
           <a:r>
-            <a:rPr lang="en-US" altLang="ko-KR" sz="2000" b="0" dirty="0" err="1" smtClean="0">
+            <a:rPr lang="en-US" altLang="ko-KR" sz="1600" b="0" dirty="0" err="1" smtClean="0">
               <a:solidFill>
                 <a:srgbClr val="0070C0"/>
               </a:solidFill>
             </a:rPr>
             <a:t>inputTB</a:t>
           </a:r>
-          <a:endParaRPr lang="en-US" altLang="ko-KR" sz="1800" b="0" dirty="0" smtClean="0">
+          <a:endParaRPr lang="en-US" altLang="ko-KR" sz="1400" b="0" dirty="0" smtClean="0">
             <a:solidFill>
               <a:srgbClr val="0070C0"/>
             </a:solidFill>
@@ -1094,7 +1111,7 @@
       </dgm:t>
     </dgm:pt>
     <dgm:pt modelId="{43E5E1C6-C1A5-4C6B-9CF6-E8C1984A2D21}">
-      <dgm:prSet/>
+      <dgm:prSet custT="1"/>
       <dgm:spPr/>
       <dgm:t>
         <a:bodyPr/>
@@ -1102,10 +1119,25 @@
         <a:p>
           <a:pPr latinLnBrk="1"/>
           <a:r>
-            <a:rPr lang="en-US" altLang="ko-KR" sz="1700" smtClean="0"/>
-            <a:t>No(PK, NN, AI, INT), ProductNo(NN, VARCHAR), ProductName(NN, VARCHAR)</a:t>
+            <a:rPr lang="en-US" altLang="ko-KR" sz="1400" dirty="0" smtClean="0"/>
+            <a:t>No(PK, NN, AI, INT), </a:t>
           </a:r>
-          <a:endParaRPr lang="en-US" altLang="ko-KR" sz="1700" dirty="0" smtClean="0"/>
+          <a:r>
+            <a:rPr lang="en-US" altLang="ko-KR" sz="1400" dirty="0" err="1" smtClean="0"/>
+            <a:t>ProductNo</a:t>
+          </a:r>
+          <a:r>
+            <a:rPr lang="en-US" altLang="ko-KR" sz="1400" dirty="0" smtClean="0"/>
+            <a:t>(NN, VARCHAR), </a:t>
+          </a:r>
+          <a:r>
+            <a:rPr lang="en-US" altLang="ko-KR" sz="1400" dirty="0" err="1" smtClean="0"/>
+            <a:t>ProductName</a:t>
+          </a:r>
+          <a:r>
+            <a:rPr lang="en-US" altLang="ko-KR" sz="1400" dirty="0" smtClean="0"/>
+            <a:t>(NN, VARCHAR)</a:t>
+          </a:r>
         </a:p>
       </dgm:t>
     </dgm:pt>
@@ -1134,7 +1166,7 @@
       </dgm:t>
     </dgm:pt>
     <dgm:pt modelId="{5D1E95E0-7ED3-4215-BE4E-62823462CB0D}">
-      <dgm:prSet/>
+      <dgm:prSet custT="1"/>
       <dgm:spPr/>
       <dgm:t>
         <a:bodyPr/>
@@ -1142,10 +1174,10 @@
         <a:p>
           <a:pPr latinLnBrk="1"/>
           <a:r>
-            <a:rPr lang="en-US" altLang="ko-KR" sz="1700" smtClean="0"/>
+            <a:rPr lang="en-US" altLang="ko-KR" sz="1400" smtClean="0"/>
             <a:t>Ea(INT), InputDate(NN, DATE)</a:t>
           </a:r>
-          <a:endParaRPr lang="en-US" altLang="ko-KR" sz="1700" dirty="0" smtClean="0"/>
+          <a:endParaRPr lang="en-US" altLang="ko-KR" sz="1400" dirty="0" smtClean="0"/>
         </a:p>
       </dgm:t>
     </dgm:pt>
@@ -1182,14 +1214,14 @@
         <a:p>
           <a:pPr latinLnBrk="1"/>
           <a:r>
-            <a:rPr lang="en-US" altLang="ko-KR" sz="2000" b="0" dirty="0" err="1" smtClean="0">
+            <a:rPr lang="en-US" altLang="ko-KR" sz="1600" b="0" dirty="0" err="1" smtClean="0">
               <a:solidFill>
                 <a:srgbClr val="0070C0"/>
               </a:solidFill>
             </a:rPr>
             <a:t>outputTB</a:t>
           </a:r>
-          <a:endParaRPr lang="en-US" altLang="ko-KR" sz="1800" b="0" dirty="0" smtClean="0">
+          <a:endParaRPr lang="en-US" altLang="ko-KR" sz="1400" b="0" dirty="0" smtClean="0">
             <a:solidFill>
               <a:srgbClr val="0070C0"/>
             </a:solidFill>
@@ -1222,7 +1254,7 @@
       </dgm:t>
     </dgm:pt>
     <dgm:pt modelId="{CE3389C4-71DA-483A-B25C-F2B886AEDEF2}">
-      <dgm:prSet/>
+      <dgm:prSet custT="1"/>
       <dgm:spPr/>
       <dgm:t>
         <a:bodyPr/>
@@ -1230,26 +1262,25 @@
         <a:p>
           <a:pPr latinLnBrk="1"/>
           <a:r>
-            <a:rPr lang="en-US" altLang="ko-KR" sz="1700" dirty="0" smtClean="0"/>
+            <a:rPr lang="en-US" altLang="ko-KR" sz="1400" dirty="0" smtClean="0"/>
             <a:t>No(PK, NN, AI, INT), </a:t>
           </a:r>
           <a:r>
-            <a:rPr lang="en-US" altLang="ko-KR" sz="1700" dirty="0" err="1" smtClean="0"/>
+            <a:rPr lang="en-US" altLang="ko-KR" sz="1400" dirty="0" err="1" smtClean="0"/>
             <a:t>ProductNo</a:t>
           </a:r>
           <a:r>
-            <a:rPr lang="en-US" altLang="ko-KR" sz="1700" dirty="0" smtClean="0"/>
+            <a:rPr lang="en-US" altLang="ko-KR" sz="1400" dirty="0" smtClean="0"/>
             <a:t>(NN, VARCHAR), </a:t>
           </a:r>
           <a:r>
-            <a:rPr lang="en-US" altLang="ko-KR" sz="1700" dirty="0" err="1" smtClean="0"/>
+            <a:rPr lang="en-US" altLang="ko-KR" sz="1400" dirty="0" err="1" smtClean="0"/>
             <a:t>ProductName</a:t>
           </a:r>
           <a:r>
-            <a:rPr lang="en-US" altLang="ko-KR" sz="1700" dirty="0" smtClean="0"/>
+            <a:rPr lang="en-US" altLang="ko-KR" sz="1400" dirty="0" smtClean="0"/>
             <a:t>(NN, VARCHAR)0</a:t>
           </a:r>
-          <a:endParaRPr lang="en-US" altLang="ko-KR" sz="1700" dirty="0" smtClean="0"/>
         </a:p>
       </dgm:t>
     </dgm:pt>
@@ -1278,7 +1309,7 @@
       </dgm:t>
     </dgm:pt>
     <dgm:pt modelId="{2C4D1BE9-F4B5-4CC0-84AE-162807EE2F06}">
-      <dgm:prSet/>
+      <dgm:prSet custT="1"/>
       <dgm:spPr/>
       <dgm:t>
         <a:bodyPr/>
@@ -1286,10 +1317,10 @@
         <a:p>
           <a:pPr latinLnBrk="1"/>
           <a:r>
-            <a:rPr lang="en-US" altLang="ko-KR" sz="1700" smtClean="0"/>
+            <a:rPr lang="en-US" altLang="ko-KR" sz="1400" smtClean="0"/>
             <a:t>Ea(INT), OutputDate(NN, DATE)</a:t>
           </a:r>
-          <a:endParaRPr lang="en-US" altLang="ko-KR" sz="1700" dirty="0" smtClean="0"/>
+          <a:endParaRPr lang="en-US" altLang="ko-KR" sz="1400" dirty="0" smtClean="0"/>
         </a:p>
       </dgm:t>
     </dgm:pt>
@@ -1326,14 +1357,14 @@
         <a:p>
           <a:pPr latinLnBrk="1"/>
           <a:r>
-            <a:rPr lang="en-US" altLang="ko-KR" sz="2000" b="0" dirty="0" err="1" smtClean="0">
+            <a:rPr lang="en-US" altLang="ko-KR" sz="1600" b="0" dirty="0" err="1" smtClean="0">
               <a:solidFill>
                 <a:srgbClr val="0070C0"/>
               </a:solidFill>
             </a:rPr>
             <a:t>inventoryTB</a:t>
           </a:r>
-          <a:endParaRPr lang="en-US" altLang="ko-KR" sz="1800" b="0" dirty="0" smtClean="0">
+          <a:endParaRPr lang="en-US" altLang="ko-KR" sz="1400" b="0" dirty="0" smtClean="0">
             <a:solidFill>
               <a:srgbClr val="0070C0"/>
             </a:solidFill>
@@ -1366,7 +1397,7 @@
       </dgm:t>
     </dgm:pt>
     <dgm:pt modelId="{4D879740-5C7A-41C7-82E3-770C59EE10E6}">
-      <dgm:prSet/>
+      <dgm:prSet custT="1"/>
       <dgm:spPr/>
       <dgm:t>
         <a:bodyPr/>
@@ -1374,10 +1405,21 @@
         <a:p>
           <a:pPr latinLnBrk="1"/>
           <a:r>
-            <a:rPr lang="en-US" altLang="ko-KR" sz="1700" smtClean="0"/>
-            <a:t>ProductNo(PK, NN, VARCHAR), ProductName(NN, VARCHAR)</a:t>
+            <a:rPr lang="en-US" altLang="ko-KR" sz="1400" dirty="0" err="1" smtClean="0"/>
+            <a:t>ProductNo</a:t>
           </a:r>
-          <a:endParaRPr lang="en-US" altLang="ko-KR" sz="1700" dirty="0" smtClean="0"/>
+          <a:r>
+            <a:rPr lang="en-US" altLang="ko-KR" sz="1400" dirty="0" smtClean="0"/>
+            <a:t>(PK, NN, VARCHAR), </a:t>
+          </a:r>
+          <a:r>
+            <a:rPr lang="en-US" altLang="ko-KR" sz="1400" dirty="0" err="1" smtClean="0"/>
+            <a:t>ProductName</a:t>
+          </a:r>
+          <a:r>
+            <a:rPr lang="en-US" altLang="ko-KR" sz="1400" dirty="0" smtClean="0"/>
+            <a:t>(NN, VARCHAR)</a:t>
+          </a:r>
         </a:p>
       </dgm:t>
     </dgm:pt>
@@ -1406,7 +1448,7 @@
       </dgm:t>
     </dgm:pt>
     <dgm:pt modelId="{E9C68ACF-514E-4726-9556-8E2502718F6E}">
-      <dgm:prSet/>
+      <dgm:prSet custT="1"/>
       <dgm:spPr/>
       <dgm:t>
         <a:bodyPr/>
@@ -1414,10 +1456,21 @@
         <a:p>
           <a:pPr latinLnBrk="1"/>
           <a:r>
-            <a:rPr lang="en-US" altLang="ko-KR" sz="1700" smtClean="0"/>
-            <a:t>Ea(INT), Cost(INT), Company(NN, VARCHAR), Etc(VARCHAR)</a:t>
+            <a:rPr lang="en-US" altLang="ko-KR" sz="1400" dirty="0" err="1" smtClean="0"/>
+            <a:t>Ea</a:t>
           </a:r>
-          <a:endParaRPr lang="en-US" altLang="ko-KR" sz="1700" dirty="0" smtClean="0"/>
+          <a:r>
+            <a:rPr lang="en-US" altLang="ko-KR" sz="1400" dirty="0" smtClean="0"/>
+            <a:t>(INT), Cost(INT), Company(NN, VARCHAR), </a:t>
+          </a:r>
+          <a:r>
+            <a:rPr lang="en-US" altLang="ko-KR" sz="1400" dirty="0" err="1" smtClean="0"/>
+            <a:t>Etc</a:t>
+          </a:r>
+          <a:r>
+            <a:rPr lang="en-US" altLang="ko-KR" sz="1400" dirty="0" smtClean="0"/>
+            <a:t>(VARCHAR)</a:t>
+          </a:r>
         </a:p>
       </dgm:t>
     </dgm:pt>
@@ -1445,6 +1498,118 @@
         </a:p>
       </dgm:t>
     </dgm:pt>
+    <dgm:pt modelId="{B2E5E181-3C06-421A-8E19-23865481796E}">
+      <dgm:prSet custT="1"/>
+      <dgm:spPr/>
+      <dgm:t>
+        <a:bodyPr/>
+        <a:lstStyle/>
+        <a:p>
+          <a:pPr latinLnBrk="1"/>
+          <a:r>
+            <a:rPr lang="en-US" altLang="ko-KR" sz="1600" b="0" dirty="0" err="1" smtClean="0">
+              <a:solidFill>
+                <a:srgbClr val="0070C0"/>
+              </a:solidFill>
+            </a:rPr>
+            <a:t>errorStatisticsTB</a:t>
+          </a:r>
+          <a:endParaRPr lang="en-US" altLang="ko-KR" sz="1600" b="0" dirty="0" smtClean="0">
+            <a:solidFill>
+              <a:srgbClr val="0070C0"/>
+            </a:solidFill>
+          </a:endParaRPr>
+        </a:p>
+      </dgm:t>
+    </dgm:pt>
+    <dgm:pt modelId="{CDBEB433-F19B-41ED-94C8-6DD168B8D71A}" type="parTrans" cxnId="{4E195384-52CA-472F-804B-A3DD39D7CA7C}">
+      <dgm:prSet/>
+      <dgm:spPr/>
+      <dgm:t>
+        <a:bodyPr/>
+        <a:lstStyle/>
+        <a:p>
+          <a:pPr latinLnBrk="1"/>
+          <a:endParaRPr lang="ko-KR" altLang="en-US"/>
+        </a:p>
+      </dgm:t>
+    </dgm:pt>
+    <dgm:pt modelId="{440AADA3-2B7F-41CB-9F02-4C1D0B800921}" type="sibTrans" cxnId="{4E195384-52CA-472F-804B-A3DD39D7CA7C}">
+      <dgm:prSet/>
+      <dgm:spPr/>
+      <dgm:t>
+        <a:bodyPr/>
+        <a:lstStyle/>
+        <a:p>
+          <a:pPr latinLnBrk="1"/>
+          <a:endParaRPr lang="ko-KR" altLang="en-US"/>
+        </a:p>
+      </dgm:t>
+    </dgm:pt>
+    <dgm:pt modelId="{678D06BB-0974-403F-BC0E-3366D429E10E}">
+      <dgm:prSet custT="1"/>
+      <dgm:spPr/>
+      <dgm:t>
+        <a:bodyPr/>
+        <a:lstStyle/>
+        <a:p>
+          <a:pPr latinLnBrk="1"/>
+          <a:r>
+            <a:rPr lang="en-US" altLang="ko-KR" sz="1400" dirty="0" smtClean="0"/>
+            <a:t>No(PK, NN, AI, INT), </a:t>
+          </a:r>
+          <a:r>
+            <a:rPr lang="en-US" altLang="ko-KR" sz="1400" dirty="0" err="1" smtClean="0"/>
+            <a:t>DateTime</a:t>
+          </a:r>
+          <a:r>
+            <a:rPr lang="en-US" altLang="ko-KR" sz="1400" dirty="0" smtClean="0"/>
+            <a:t>(NN, DATETIME), </a:t>
+          </a:r>
+          <a:r>
+            <a:rPr lang="en-US" altLang="ko-KR" sz="1400" dirty="0" err="1" smtClean="0"/>
+            <a:t>SensorName</a:t>
+          </a:r>
+          <a:r>
+            <a:rPr lang="en-US" altLang="ko-KR" sz="1400" dirty="0" smtClean="0"/>
+            <a:t>(NN, VARCHAR), </a:t>
+          </a:r>
+          <a:r>
+            <a:rPr lang="en-US" altLang="ko-KR" sz="1400" dirty="0" err="1" smtClean="0"/>
+            <a:t>ErrorCount</a:t>
+          </a:r>
+          <a:r>
+            <a:rPr lang="en-US" altLang="ko-KR" sz="1400" dirty="0" smtClean="0"/>
+            <a:t>(NN, INT)</a:t>
+          </a:r>
+          <a:endParaRPr lang="en-US" altLang="ko-KR" sz="1400" dirty="0" smtClean="0"/>
+        </a:p>
+      </dgm:t>
+    </dgm:pt>
+    <dgm:pt modelId="{9BEE6C61-C7F1-4B21-B619-1CA8B5A0AE81}" type="parTrans" cxnId="{EFE17068-35BB-49A0-BDAF-69C5D091D926}">
+      <dgm:prSet/>
+      <dgm:spPr/>
+      <dgm:t>
+        <a:bodyPr/>
+        <a:lstStyle/>
+        <a:p>
+          <a:pPr latinLnBrk="1"/>
+          <a:endParaRPr lang="ko-KR" altLang="en-US"/>
+        </a:p>
+      </dgm:t>
+    </dgm:pt>
+    <dgm:pt modelId="{B395E552-09CB-4849-B94E-55E06078C5BF}" type="sibTrans" cxnId="{EFE17068-35BB-49A0-BDAF-69C5D091D926}">
+      <dgm:prSet/>
+      <dgm:spPr/>
+      <dgm:t>
+        <a:bodyPr/>
+        <a:lstStyle/>
+        <a:p>
+          <a:pPr latinLnBrk="1"/>
+          <a:endParaRPr lang="ko-KR" altLang="en-US"/>
+        </a:p>
+      </dgm:t>
+    </dgm:pt>
     <dgm:pt modelId="{F358342B-DFAB-46D0-81F9-BB5DFDA11D5A}" type="pres">
       <dgm:prSet presAssocID="{56F0CB8E-15C5-48E3-BBB9-7EB32C5542C9}" presName="linear" presStyleCnt="0">
         <dgm:presLayoutVars>
@@ -1454,6 +1619,14 @@
         </dgm:presLayoutVars>
       </dgm:prSet>
       <dgm:spPr/>
+      <dgm:t>
+        <a:bodyPr/>
+        <a:lstStyle/>
+        <a:p>
+          <a:pPr latinLnBrk="1"/>
+          <a:endParaRPr lang="ko-KR" altLang="en-US"/>
+        </a:p>
+      </dgm:t>
     </dgm:pt>
     <dgm:pt modelId="{F2D01EF1-3780-458A-B20A-30168ACC03B4}" type="pres">
       <dgm:prSet presAssocID="{95FF17C5-A7F5-4547-BC7E-E78BE5AFD9D6}" presName="parentLin" presStyleCnt="0"/>
@@ -1462,6 +1635,14 @@
     <dgm:pt modelId="{2A249B33-846E-4071-B414-C599534D6A9E}" type="pres">
       <dgm:prSet presAssocID="{95FF17C5-A7F5-4547-BC7E-E78BE5AFD9D6}" presName="parentLeftMargin" presStyleLbl="node1" presStyleIdx="0" presStyleCnt="1"/>
       <dgm:spPr/>
+      <dgm:t>
+        <a:bodyPr/>
+        <a:lstStyle/>
+        <a:p>
+          <a:pPr latinLnBrk="1"/>
+          <a:endParaRPr lang="ko-KR" altLang="en-US"/>
+        </a:p>
+      </dgm:t>
     </dgm:pt>
     <dgm:pt modelId="{D35A0036-4950-4ED1-9FBB-2058D41D07BF}" type="pres">
       <dgm:prSet presAssocID="{95FF17C5-A7F5-4547-BC7E-E78BE5AFD9D6}" presName="parentText" presStyleLbl="node1" presStyleIdx="0" presStyleCnt="1" custScaleX="34398" custScaleY="151368">
@@ -1471,6 +1652,14 @@
         </dgm:presLayoutVars>
       </dgm:prSet>
       <dgm:spPr/>
+      <dgm:t>
+        <a:bodyPr/>
+        <a:lstStyle/>
+        <a:p>
+          <a:pPr latinLnBrk="1"/>
+          <a:endParaRPr lang="ko-KR" altLang="en-US"/>
+        </a:p>
+      </dgm:t>
     </dgm:pt>
     <dgm:pt modelId="{58743C2C-9827-4264-95AF-D174AD8B04CD}" type="pres">
       <dgm:prSet presAssocID="{95FF17C5-A7F5-4547-BC7E-E78BE5AFD9D6}" presName="negativeSpace" presStyleCnt="0"/>
@@ -1495,6 +1684,7 @@
   </dgm:ptLst>
   <dgm:cxnLst>
     <dgm:cxn modelId="{8A0E232C-1D44-4C6F-88DA-51BBF17CDB2A}" srcId="{95FF17C5-A7F5-4547-BC7E-E78BE5AFD9D6}" destId="{1EADF816-D32E-4A0D-92C2-CB2095FD353F}" srcOrd="2" destOrd="0" parTransId="{BE93D50A-024E-4C61-A9FB-29AF1B06878F}" sibTransId="{787E8B41-608B-4FD8-9400-EED28E981148}"/>
+    <dgm:cxn modelId="{4E195384-52CA-472F-804B-A3DD39D7CA7C}" srcId="{95FF17C5-A7F5-4547-BC7E-E78BE5AFD9D6}" destId="{B2E5E181-3C06-421A-8E19-23865481796E}" srcOrd="4" destOrd="0" parTransId="{CDBEB433-F19B-41ED-94C8-6DD168B8D71A}" sibTransId="{440AADA3-2B7F-41CB-9F02-4C1D0B800921}"/>
     <dgm:cxn modelId="{1EB745CF-B27D-402B-B0BC-B1A13E465257}" type="presOf" srcId="{95FF17C5-A7F5-4547-BC7E-E78BE5AFD9D6}" destId="{2A249B33-846E-4071-B414-C599534D6A9E}" srcOrd="0" destOrd="0" presId="urn:microsoft.com/office/officeart/2005/8/layout/list1"/>
     <dgm:cxn modelId="{69BC6D33-D582-4C43-BF4A-3A5AAF5AAB46}" type="presOf" srcId="{43E5E1C6-C1A5-4C6B-9CF6-E8C1984A2D21}" destId="{A245447B-ACE2-48F4-A294-D3CB4B45E5F9}" srcOrd="0" destOrd="4" presId="urn:microsoft.com/office/officeart/2005/8/layout/list1"/>
     <dgm:cxn modelId="{8D1647C8-1138-4EFC-B535-11F816CD06D7}" type="presOf" srcId="{E45374C0-7364-4850-9FB1-8F9CDE8E4F5B}" destId="{A245447B-ACE2-48F4-A294-D3CB4B45E5F9}" srcOrd="0" destOrd="2" presId="urn:microsoft.com/office/officeart/2005/8/layout/list1"/>
@@ -1509,18 +1699,21 @@
     <dgm:cxn modelId="{DB9EDAC9-FF57-4AE5-B652-205D7A5E1914}" type="presOf" srcId="{56F0CB8E-15C5-48E3-BBB9-7EB32C5542C9}" destId="{F358342B-DFAB-46D0-81F9-BB5DFDA11D5A}" srcOrd="0" destOrd="0" presId="urn:microsoft.com/office/officeart/2005/8/layout/list1"/>
     <dgm:cxn modelId="{67EA1F0F-BE9E-4AB2-92B0-BC3A4760D92F}" srcId="{95FF17C5-A7F5-4547-BC7E-E78BE5AFD9D6}" destId="{EECB01BE-180B-49B6-96D9-8CB92380AC82}" srcOrd="0" destOrd="0" parTransId="{50CF373A-0EDD-4DE7-816B-C4483CBFE2F7}" sibTransId="{2E3B3639-29D3-4E39-9BF0-C6C7CCA748DF}"/>
     <dgm:cxn modelId="{C2D6AA1B-9AAC-4379-829D-14358F463F9E}" type="presOf" srcId="{EECB01BE-180B-49B6-96D9-8CB92380AC82}" destId="{A245447B-ACE2-48F4-A294-D3CB4B45E5F9}" srcOrd="0" destOrd="0" presId="urn:microsoft.com/office/officeart/2005/8/layout/list1"/>
+    <dgm:cxn modelId="{793B956B-E802-4F36-A0D2-0EFA63460578}" type="presOf" srcId="{678D06BB-0974-403F-BC0E-3366D429E10E}" destId="{A245447B-ACE2-48F4-A294-D3CB4B45E5F9}" srcOrd="0" destOrd="13" presId="urn:microsoft.com/office/officeart/2005/8/layout/list1"/>
     <dgm:cxn modelId="{08FC7D94-C99C-4E76-81EF-7FC52BCCEE80}" type="presOf" srcId="{40B0E851-86A7-4A03-843E-53D93C57DDE2}" destId="{A245447B-ACE2-48F4-A294-D3CB4B45E5F9}" srcOrd="0" destOrd="3" presId="urn:microsoft.com/office/officeart/2005/8/layout/list1"/>
     <dgm:cxn modelId="{9B4E2D8D-5B6E-4BBB-8C3A-D2B39C7A1F82}" type="presOf" srcId="{1EADF816-D32E-4A0D-92C2-CB2095FD353F}" destId="{A245447B-ACE2-48F4-A294-D3CB4B45E5F9}" srcOrd="0" destOrd="6" presId="urn:microsoft.com/office/officeart/2005/8/layout/list1"/>
     <dgm:cxn modelId="{868575F2-4205-4B22-BD74-CA65FA846A08}" type="presOf" srcId="{AC37651C-C53C-48ED-85F1-6FBD272B6D59}" destId="{A245447B-ACE2-48F4-A294-D3CB4B45E5F9}" srcOrd="0" destOrd="9" presId="urn:microsoft.com/office/officeart/2005/8/layout/list1"/>
     <dgm:cxn modelId="{5A2C77D0-4C28-4394-9F11-7F2DAE7891FB}" type="presOf" srcId="{CE3389C4-71DA-483A-B25C-F2B886AEDEF2}" destId="{A245447B-ACE2-48F4-A294-D3CB4B45E5F9}" srcOrd="0" destOrd="7" presId="urn:microsoft.com/office/officeart/2005/8/layout/list1"/>
+    <dgm:cxn modelId="{EFE17068-35BB-49A0-BDAF-69C5D091D926}" srcId="{B2E5E181-3C06-421A-8E19-23865481796E}" destId="{678D06BB-0974-403F-BC0E-3366D429E10E}" srcOrd="0" destOrd="0" parTransId="{9BEE6C61-C7F1-4B21-B619-1CA8B5A0AE81}" sibTransId="{B395E552-09CB-4849-B94E-55E06078C5BF}"/>
     <dgm:cxn modelId="{62FE8494-FB0C-4642-A57E-39607E09BA72}" srcId="{40B0E851-86A7-4A03-843E-53D93C57DDE2}" destId="{5D1E95E0-7ED3-4215-BE4E-62823462CB0D}" srcOrd="1" destOrd="0" parTransId="{E7E0C88F-0FD7-4FD1-B52D-EE8C5E918478}" sibTransId="{6B9625B9-A42A-4A44-94BD-2A46B982EA7D}"/>
     <dgm:cxn modelId="{92EC18AE-F43A-4826-B28E-31DD790E3CA1}" srcId="{95FF17C5-A7F5-4547-BC7E-E78BE5AFD9D6}" destId="{40B0E851-86A7-4A03-843E-53D93C57DDE2}" srcOrd="1" destOrd="0" parTransId="{53705158-E124-4FE4-B1C7-58DC50AC61D7}" sibTransId="{8E7D2841-4797-4B7C-95E0-577187953647}"/>
     <dgm:cxn modelId="{306F9EF6-BFB7-474A-93DB-2265C7A38946}" type="presOf" srcId="{95FF17C5-A7F5-4547-BC7E-E78BE5AFD9D6}" destId="{D35A0036-4950-4ED1-9FBB-2058D41D07BF}" srcOrd="1" destOrd="0" presId="urn:microsoft.com/office/officeart/2005/8/layout/list1"/>
+    <dgm:cxn modelId="{A2C12446-FBB5-446C-9027-8F7E2AAE8F12}" srcId="{95FF17C5-A7F5-4547-BC7E-E78BE5AFD9D6}" destId="{AC37651C-C53C-48ED-85F1-6FBD272B6D59}" srcOrd="3" destOrd="0" parTransId="{4B46FAA5-12DD-4CBE-BB50-D2C5FA87A0F7}" sibTransId="{96F54190-A47A-43A0-AF64-9B5A0211DC52}"/>
     <dgm:cxn modelId="{01A1C9E5-EAA0-4B72-90C5-8C2FFA1C0D81}" type="presOf" srcId="{5D1E95E0-7ED3-4215-BE4E-62823462CB0D}" destId="{A245447B-ACE2-48F4-A294-D3CB4B45E5F9}" srcOrd="0" destOrd="5" presId="urn:microsoft.com/office/officeart/2005/8/layout/list1"/>
-    <dgm:cxn modelId="{A2C12446-FBB5-446C-9027-8F7E2AAE8F12}" srcId="{95FF17C5-A7F5-4547-BC7E-E78BE5AFD9D6}" destId="{AC37651C-C53C-48ED-85F1-6FBD272B6D59}" srcOrd="3" destOrd="0" parTransId="{4B46FAA5-12DD-4CBE-BB50-D2C5FA87A0F7}" sibTransId="{96F54190-A47A-43A0-AF64-9B5A0211DC52}"/>
     <dgm:cxn modelId="{C2FAC92A-D70D-424F-AC90-E933C26169E6}" type="presOf" srcId="{2C4D1BE9-F4B5-4CC0-84AE-162807EE2F06}" destId="{A245447B-ACE2-48F4-A294-D3CB4B45E5F9}" srcOrd="0" destOrd="8" presId="urn:microsoft.com/office/officeart/2005/8/layout/list1"/>
     <dgm:cxn modelId="{671E0BCA-CC4E-4BF6-B606-77D5404368E8}" type="presOf" srcId="{7D4198FD-EEB3-4150-B740-EF990199F6E0}" destId="{A245447B-ACE2-48F4-A294-D3CB4B45E5F9}" srcOrd="0" destOrd="1" presId="urn:microsoft.com/office/officeart/2005/8/layout/list1"/>
     <dgm:cxn modelId="{282C9256-D016-47B2-B9A6-CA20DEB1AB8D}" srcId="{1EADF816-D32E-4A0D-92C2-CB2095FD353F}" destId="{2C4D1BE9-F4B5-4CC0-84AE-162807EE2F06}" srcOrd="1" destOrd="0" parTransId="{0005B264-3428-4DC3-90D7-362850E1BD67}" sibTransId="{B0EF6A9B-1207-49AC-9376-8A57DA776D2A}"/>
+    <dgm:cxn modelId="{FCCDF8B9-EA1B-4E5A-9111-7954B1145A57}" type="presOf" srcId="{B2E5E181-3C06-421A-8E19-23865481796E}" destId="{A245447B-ACE2-48F4-A294-D3CB4B45E5F9}" srcOrd="0" destOrd="12" presId="urn:microsoft.com/office/officeart/2005/8/layout/list1"/>
     <dgm:cxn modelId="{E4C3A62A-5314-4924-866C-66928C544F83}" srcId="{EECB01BE-180B-49B6-96D9-8CB92380AC82}" destId="{E45374C0-7364-4850-9FB1-8F9CDE8E4F5B}" srcOrd="1" destOrd="0" parTransId="{BFEA45AE-B26B-414C-AB68-BE619C5203F5}" sibTransId="{D37A9D81-91A7-45E5-83D8-10EAD482CF0A}"/>
     <dgm:cxn modelId="{252C257C-41A1-4DC4-8945-C38A67DA13A6}" type="presParOf" srcId="{F358342B-DFAB-46D0-81F9-BB5DFDA11D5A}" destId="{F2D01EF1-3780-458A-B20A-30168ACC03B4}" srcOrd="0" destOrd="0" presId="urn:microsoft.com/office/officeart/2005/8/layout/list1"/>
     <dgm:cxn modelId="{C69ADA18-02BF-4DCE-AC7B-30B8F12D34D2}" type="presParOf" srcId="{F2D01EF1-3780-458A-B20A-30168ACC03B4}" destId="{2A249B33-846E-4071-B414-C599534D6A9E}" srcOrd="0" destOrd="0" presId="urn:microsoft.com/office/officeart/2005/8/layout/list1"/>
@@ -1553,8 +1746,8 @@
       </dsp:nvSpPr>
       <dsp:spPr>
         <a:xfrm>
-          <a:off x="0" y="434884"/>
-          <a:ext cx="10835640" cy="5380200"/>
+          <a:off x="0" y="576632"/>
+          <a:ext cx="10835640" cy="5216400"/>
         </a:xfrm>
         <a:prstGeom prst="rect">
           <a:avLst/>
@@ -1595,12 +1788,12 @@
         <a:fontRef idx="minor"/>
       </dsp:style>
       <dsp:txBody>
-        <a:bodyPr spcFirstLastPara="0" vert="horz" wrap="square" lIns="840966" tIns="291592" rIns="840966" bIns="142240" numCol="1" spcCol="1270" anchor="t" anchorCtr="0">
+        <a:bodyPr spcFirstLastPara="0" vert="horz" wrap="square" lIns="840966" tIns="374904" rIns="840966" bIns="113792" numCol="1" spcCol="1270" anchor="t" anchorCtr="0">
           <a:noAutofit/>
         </a:bodyPr>
         <a:lstStyle/>
         <a:p>
-          <a:pPr marL="228600" lvl="1" indent="-228600" algn="l" defTabSz="889000" latinLnBrk="1">
+          <a:pPr marL="171450" lvl="1" indent="-171450" algn="l" defTabSz="711200" latinLnBrk="1">
             <a:lnSpc>
               <a:spcPct val="90000"/>
             </a:lnSpc>
@@ -1613,21 +1806,21 @@
             <a:buChar char="••"/>
           </a:pPr>
           <a:r>
-            <a:rPr lang="en-US" altLang="ko-KR" sz="2000" b="0" kern="1200" smtClean="0">
+            <a:rPr lang="en-US" altLang="ko-KR" sz="1600" b="0" kern="1200" smtClean="0">
               <a:solidFill>
                 <a:srgbClr val="0070C0"/>
               </a:solidFill>
             </a:rPr>
             <a:t>deviceworkingTB</a:t>
           </a:r>
-          <a:endParaRPr lang="en-US" altLang="ko-KR" sz="1800" b="0" kern="1200" dirty="0" smtClean="0">
+          <a:endParaRPr lang="en-US" altLang="ko-KR" sz="1400" b="0" kern="1200" dirty="0" smtClean="0">
             <a:solidFill>
               <a:srgbClr val="0070C0"/>
             </a:solidFill>
           </a:endParaRPr>
         </a:p>
         <a:p>
-          <a:pPr marL="342900" lvl="2" indent="-171450" algn="l" defTabSz="755650" latinLnBrk="1">
+          <a:pPr marL="228600" lvl="2" indent="-114300" algn="l" defTabSz="622300" latinLnBrk="1">
             <a:lnSpc>
               <a:spcPct val="90000"/>
             </a:lnSpc>
@@ -1640,13 +1833,13 @@
             <a:buChar char="••"/>
           </a:pPr>
           <a:r>
-            <a:rPr lang="en-US" altLang="ko-KR" sz="1700" kern="1200" smtClean="0"/>
+            <a:rPr lang="en-US" altLang="ko-KR" sz="1400" kern="1200" smtClean="0"/>
             <a:t>No(PK, NN, AI, INT), LineNo(NN, VARCHAR), DeviceName(NN, VARCHAR)</a:t>
           </a:r>
-          <a:endParaRPr lang="en-US" altLang="ko-KR" sz="1700" kern="1200" dirty="0" smtClean="0"/>
+          <a:endParaRPr lang="en-US" altLang="ko-KR" sz="1400" kern="1200" dirty="0" smtClean="0"/>
         </a:p>
         <a:p>
-          <a:pPr marL="342900" lvl="2" indent="-171450" algn="l" defTabSz="755650" latinLnBrk="1">
+          <a:pPr marL="228600" lvl="2" indent="-114300" algn="l" defTabSz="622300" latinLnBrk="1">
             <a:lnSpc>
               <a:spcPct val="90000"/>
             </a:lnSpc>
@@ -1659,13 +1852,24 @@
             <a:buChar char="••"/>
           </a:pPr>
           <a:r>
-            <a:rPr lang="en-US" altLang="ko-KR" sz="1700" kern="1200" smtClean="0"/>
-            <a:t>StartTime(DATETIME), EndTime(DATETIME), Status(VARCHAR)</a:t>
+            <a:rPr lang="en-US" altLang="ko-KR" sz="1400" kern="1200" dirty="0" err="1" smtClean="0"/>
+            <a:t>StartTime</a:t>
           </a:r>
-          <a:endParaRPr lang="en-US" altLang="ko-KR" sz="1700" kern="1200" dirty="0" smtClean="0"/>
+          <a:r>
+            <a:rPr lang="en-US" altLang="ko-KR" sz="1400" kern="1200" dirty="0" smtClean="0"/>
+            <a:t>(DATETIME), </a:t>
+          </a:r>
+          <a:r>
+            <a:rPr lang="en-US" altLang="ko-KR" sz="1400" kern="1200" dirty="0" err="1" smtClean="0"/>
+            <a:t>EndTime</a:t>
+          </a:r>
+          <a:r>
+            <a:rPr lang="en-US" altLang="ko-KR" sz="1400" kern="1200" dirty="0" smtClean="0"/>
+            <a:t>(DATETIME), Status(VARCHAR)</a:t>
+          </a:r>
         </a:p>
         <a:p>
-          <a:pPr marL="228600" lvl="1" indent="-228600" algn="l" defTabSz="889000" latinLnBrk="1">
+          <a:pPr marL="171450" lvl="1" indent="-171450" algn="l" defTabSz="711200" latinLnBrk="1">
             <a:lnSpc>
               <a:spcPct val="90000"/>
             </a:lnSpc>
@@ -1678,21 +1882,21 @@
             <a:buChar char="••"/>
           </a:pPr>
           <a:r>
-            <a:rPr lang="en-US" altLang="ko-KR" sz="2000" b="0" kern="1200" dirty="0" err="1" smtClean="0">
+            <a:rPr lang="en-US" altLang="ko-KR" sz="1600" b="0" kern="1200" dirty="0" err="1" smtClean="0">
               <a:solidFill>
                 <a:srgbClr val="0070C0"/>
               </a:solidFill>
             </a:rPr>
             <a:t>inputTB</a:t>
           </a:r>
-          <a:endParaRPr lang="en-US" altLang="ko-KR" sz="1800" b="0" kern="1200" dirty="0" smtClean="0">
+          <a:endParaRPr lang="en-US" altLang="ko-KR" sz="1400" b="0" kern="1200" dirty="0" smtClean="0">
             <a:solidFill>
               <a:srgbClr val="0070C0"/>
             </a:solidFill>
           </a:endParaRPr>
         </a:p>
         <a:p>
-          <a:pPr marL="342900" lvl="2" indent="-171450" algn="l" defTabSz="755650" latinLnBrk="1">
+          <a:pPr marL="228600" lvl="2" indent="-114300" algn="l" defTabSz="622300" latinLnBrk="1">
             <a:lnSpc>
               <a:spcPct val="90000"/>
             </a:lnSpc>
@@ -1705,13 +1909,28 @@
             <a:buChar char="••"/>
           </a:pPr>
           <a:r>
-            <a:rPr lang="en-US" altLang="ko-KR" sz="1700" kern="1200" smtClean="0"/>
-            <a:t>No(PK, NN, AI, INT), ProductNo(NN, VARCHAR), ProductName(NN, VARCHAR)</a:t>
+            <a:rPr lang="en-US" altLang="ko-KR" sz="1400" kern="1200" dirty="0" smtClean="0"/>
+            <a:t>No(PK, NN, AI, INT), </a:t>
           </a:r>
-          <a:endParaRPr lang="en-US" altLang="ko-KR" sz="1700" kern="1200" dirty="0" smtClean="0"/>
+          <a:r>
+            <a:rPr lang="en-US" altLang="ko-KR" sz="1400" kern="1200" dirty="0" err="1" smtClean="0"/>
+            <a:t>ProductNo</a:t>
+          </a:r>
+          <a:r>
+            <a:rPr lang="en-US" altLang="ko-KR" sz="1400" kern="1200" dirty="0" smtClean="0"/>
+            <a:t>(NN, VARCHAR), </a:t>
+          </a:r>
+          <a:r>
+            <a:rPr lang="en-US" altLang="ko-KR" sz="1400" kern="1200" dirty="0" err="1" smtClean="0"/>
+            <a:t>ProductName</a:t>
+          </a:r>
+          <a:r>
+            <a:rPr lang="en-US" altLang="ko-KR" sz="1400" kern="1200" dirty="0" smtClean="0"/>
+            <a:t>(NN, VARCHAR)</a:t>
+          </a:r>
         </a:p>
         <a:p>
-          <a:pPr marL="342900" lvl="2" indent="-171450" algn="l" defTabSz="755650" latinLnBrk="1">
+          <a:pPr marL="228600" lvl="2" indent="-114300" algn="l" defTabSz="622300" latinLnBrk="1">
             <a:lnSpc>
               <a:spcPct val="90000"/>
             </a:lnSpc>
@@ -1724,13 +1943,13 @@
             <a:buChar char="••"/>
           </a:pPr>
           <a:r>
-            <a:rPr lang="en-US" altLang="ko-KR" sz="1700" kern="1200" smtClean="0"/>
+            <a:rPr lang="en-US" altLang="ko-KR" sz="1400" kern="1200" smtClean="0"/>
             <a:t>Ea(INT), InputDate(NN, DATE)</a:t>
           </a:r>
-          <a:endParaRPr lang="en-US" altLang="ko-KR" sz="1700" kern="1200" dirty="0" smtClean="0"/>
+          <a:endParaRPr lang="en-US" altLang="ko-KR" sz="1400" kern="1200" dirty="0" smtClean="0"/>
         </a:p>
         <a:p>
-          <a:pPr marL="228600" lvl="1" indent="-228600" algn="l" defTabSz="889000" latinLnBrk="1">
+          <a:pPr marL="171450" lvl="1" indent="-171450" algn="l" defTabSz="711200" latinLnBrk="1">
             <a:lnSpc>
               <a:spcPct val="90000"/>
             </a:lnSpc>
@@ -1743,21 +1962,21 @@
             <a:buChar char="••"/>
           </a:pPr>
           <a:r>
-            <a:rPr lang="en-US" altLang="ko-KR" sz="2000" b="0" kern="1200" dirty="0" err="1" smtClean="0">
+            <a:rPr lang="en-US" altLang="ko-KR" sz="1600" b="0" kern="1200" dirty="0" err="1" smtClean="0">
               <a:solidFill>
                 <a:srgbClr val="0070C0"/>
               </a:solidFill>
             </a:rPr>
             <a:t>outputTB</a:t>
           </a:r>
-          <a:endParaRPr lang="en-US" altLang="ko-KR" sz="1800" b="0" kern="1200" dirty="0" smtClean="0">
+          <a:endParaRPr lang="en-US" altLang="ko-KR" sz="1400" b="0" kern="1200" dirty="0" smtClean="0">
             <a:solidFill>
               <a:srgbClr val="0070C0"/>
             </a:solidFill>
           </a:endParaRPr>
         </a:p>
         <a:p>
-          <a:pPr marL="342900" lvl="2" indent="-171450" algn="l" defTabSz="755650" latinLnBrk="1">
+          <a:pPr marL="228600" lvl="2" indent="-114300" algn="l" defTabSz="622300" latinLnBrk="1">
             <a:lnSpc>
               <a:spcPct val="90000"/>
             </a:lnSpc>
@@ -1770,29 +1989,28 @@
             <a:buChar char="••"/>
           </a:pPr>
           <a:r>
-            <a:rPr lang="en-US" altLang="ko-KR" sz="1700" kern="1200" dirty="0" smtClean="0"/>
+            <a:rPr lang="en-US" altLang="ko-KR" sz="1400" kern="1200" dirty="0" smtClean="0"/>
             <a:t>No(PK, NN, AI, INT), </a:t>
           </a:r>
           <a:r>
-            <a:rPr lang="en-US" altLang="ko-KR" sz="1700" kern="1200" dirty="0" err="1" smtClean="0"/>
+            <a:rPr lang="en-US" altLang="ko-KR" sz="1400" kern="1200" dirty="0" err="1" smtClean="0"/>
             <a:t>ProductNo</a:t>
           </a:r>
           <a:r>
-            <a:rPr lang="en-US" altLang="ko-KR" sz="1700" kern="1200" dirty="0" smtClean="0"/>
+            <a:rPr lang="en-US" altLang="ko-KR" sz="1400" kern="1200" dirty="0" smtClean="0"/>
             <a:t>(NN, VARCHAR), </a:t>
           </a:r>
           <a:r>
-            <a:rPr lang="en-US" altLang="ko-KR" sz="1700" kern="1200" dirty="0" err="1" smtClean="0"/>
+            <a:rPr lang="en-US" altLang="ko-KR" sz="1400" kern="1200" dirty="0" err="1" smtClean="0"/>
             <a:t>ProductName</a:t>
           </a:r>
           <a:r>
-            <a:rPr lang="en-US" altLang="ko-KR" sz="1700" kern="1200" dirty="0" smtClean="0"/>
+            <a:rPr lang="en-US" altLang="ko-KR" sz="1400" kern="1200" dirty="0" smtClean="0"/>
             <a:t>(NN, VARCHAR)0</a:t>
           </a:r>
-          <a:endParaRPr lang="en-US" altLang="ko-KR" sz="1700" kern="1200" dirty="0" smtClean="0"/>
         </a:p>
         <a:p>
-          <a:pPr marL="342900" lvl="2" indent="-171450" algn="l" defTabSz="755650" latinLnBrk="1">
+          <a:pPr marL="228600" lvl="2" indent="-114300" algn="l" defTabSz="622300" latinLnBrk="1">
             <a:lnSpc>
               <a:spcPct val="90000"/>
             </a:lnSpc>
@@ -1805,13 +2023,13 @@
             <a:buChar char="••"/>
           </a:pPr>
           <a:r>
-            <a:rPr lang="en-US" altLang="ko-KR" sz="1700" kern="1200" smtClean="0"/>
+            <a:rPr lang="en-US" altLang="ko-KR" sz="1400" kern="1200" smtClean="0"/>
             <a:t>Ea(INT), OutputDate(NN, DATE)</a:t>
           </a:r>
-          <a:endParaRPr lang="en-US" altLang="ko-KR" sz="1700" kern="1200" dirty="0" smtClean="0"/>
+          <a:endParaRPr lang="en-US" altLang="ko-KR" sz="1400" kern="1200" dirty="0" smtClean="0"/>
         </a:p>
         <a:p>
-          <a:pPr marL="228600" lvl="1" indent="-228600" algn="l" defTabSz="889000" latinLnBrk="1">
+          <a:pPr marL="171450" lvl="1" indent="-171450" algn="l" defTabSz="711200" latinLnBrk="1">
             <a:lnSpc>
               <a:spcPct val="90000"/>
             </a:lnSpc>
@@ -1824,21 +2042,21 @@
             <a:buChar char="••"/>
           </a:pPr>
           <a:r>
-            <a:rPr lang="en-US" altLang="ko-KR" sz="2000" b="0" kern="1200" dirty="0" err="1" smtClean="0">
+            <a:rPr lang="en-US" altLang="ko-KR" sz="1600" b="0" kern="1200" dirty="0" err="1" smtClean="0">
               <a:solidFill>
                 <a:srgbClr val="0070C0"/>
               </a:solidFill>
             </a:rPr>
             <a:t>inventoryTB</a:t>
           </a:r>
-          <a:endParaRPr lang="en-US" altLang="ko-KR" sz="1800" b="0" kern="1200" dirty="0" smtClean="0">
+          <a:endParaRPr lang="en-US" altLang="ko-KR" sz="1400" b="0" kern="1200" dirty="0" smtClean="0">
             <a:solidFill>
               <a:srgbClr val="0070C0"/>
             </a:solidFill>
           </a:endParaRPr>
         </a:p>
         <a:p>
-          <a:pPr marL="342900" lvl="2" indent="-171450" algn="l" defTabSz="755650" latinLnBrk="1">
+          <a:pPr marL="228600" lvl="2" indent="-114300" algn="l" defTabSz="622300" latinLnBrk="1">
             <a:lnSpc>
               <a:spcPct val="90000"/>
             </a:lnSpc>
@@ -1851,13 +2069,24 @@
             <a:buChar char="••"/>
           </a:pPr>
           <a:r>
-            <a:rPr lang="en-US" altLang="ko-KR" sz="1700" kern="1200" smtClean="0"/>
-            <a:t>ProductNo(PK, NN, VARCHAR), ProductName(NN, VARCHAR)</a:t>
+            <a:rPr lang="en-US" altLang="ko-KR" sz="1400" kern="1200" dirty="0" err="1" smtClean="0"/>
+            <a:t>ProductNo</a:t>
           </a:r>
-          <a:endParaRPr lang="en-US" altLang="ko-KR" sz="1700" kern="1200" dirty="0" smtClean="0"/>
+          <a:r>
+            <a:rPr lang="en-US" altLang="ko-KR" sz="1400" kern="1200" dirty="0" smtClean="0"/>
+            <a:t>(PK, NN, VARCHAR), </a:t>
+          </a:r>
+          <a:r>
+            <a:rPr lang="en-US" altLang="ko-KR" sz="1400" kern="1200" dirty="0" err="1" smtClean="0"/>
+            <a:t>ProductName</a:t>
+          </a:r>
+          <a:r>
+            <a:rPr lang="en-US" altLang="ko-KR" sz="1400" kern="1200" dirty="0" smtClean="0"/>
+            <a:t>(NN, VARCHAR)</a:t>
+          </a:r>
         </a:p>
         <a:p>
-          <a:pPr marL="342900" lvl="2" indent="-171450" algn="l" defTabSz="755650" latinLnBrk="1">
+          <a:pPr marL="228600" lvl="2" indent="-114300" algn="l" defTabSz="622300" latinLnBrk="1">
             <a:lnSpc>
               <a:spcPct val="90000"/>
             </a:lnSpc>
@@ -1870,15 +2099,96 @@
             <a:buChar char="••"/>
           </a:pPr>
           <a:r>
-            <a:rPr lang="en-US" altLang="ko-KR" sz="1700" kern="1200" smtClean="0"/>
-            <a:t>Ea(INT), Cost(INT), Company(NN, VARCHAR), Etc(VARCHAR)</a:t>
+            <a:rPr lang="en-US" altLang="ko-KR" sz="1400" kern="1200" dirty="0" err="1" smtClean="0"/>
+            <a:t>Ea</a:t>
           </a:r>
-          <a:endParaRPr lang="en-US" altLang="ko-KR" sz="1700" kern="1200" dirty="0" smtClean="0"/>
+          <a:r>
+            <a:rPr lang="en-US" altLang="ko-KR" sz="1400" kern="1200" dirty="0" smtClean="0"/>
+            <a:t>(INT), Cost(INT), Company(NN, VARCHAR), </a:t>
+          </a:r>
+          <a:r>
+            <a:rPr lang="en-US" altLang="ko-KR" sz="1400" kern="1200" dirty="0" err="1" smtClean="0"/>
+            <a:t>Etc</a:t>
+          </a:r>
+          <a:r>
+            <a:rPr lang="en-US" altLang="ko-KR" sz="1400" kern="1200" dirty="0" smtClean="0"/>
+            <a:t>(VARCHAR)</a:t>
+          </a:r>
+        </a:p>
+        <a:p>
+          <a:pPr marL="171450" lvl="1" indent="-171450" algn="l" defTabSz="711200" latinLnBrk="1">
+            <a:lnSpc>
+              <a:spcPct val="90000"/>
+            </a:lnSpc>
+            <a:spcBef>
+              <a:spcPct val="0"/>
+            </a:spcBef>
+            <a:spcAft>
+              <a:spcPct val="15000"/>
+            </a:spcAft>
+            <a:buChar char="••"/>
+          </a:pPr>
+          <a:r>
+            <a:rPr lang="en-US" altLang="ko-KR" sz="1600" b="0" kern="1200" dirty="0" err="1" smtClean="0">
+              <a:solidFill>
+                <a:srgbClr val="0070C0"/>
+              </a:solidFill>
+            </a:rPr>
+            <a:t>errorStatisticsTB</a:t>
+          </a:r>
+          <a:endParaRPr lang="en-US" altLang="ko-KR" sz="1600" b="0" kern="1200" dirty="0" smtClean="0">
+            <a:solidFill>
+              <a:srgbClr val="0070C0"/>
+            </a:solidFill>
+          </a:endParaRPr>
+        </a:p>
+        <a:p>
+          <a:pPr marL="228600" lvl="2" indent="-114300" algn="l" defTabSz="622300" latinLnBrk="1">
+            <a:lnSpc>
+              <a:spcPct val="90000"/>
+            </a:lnSpc>
+            <a:spcBef>
+              <a:spcPct val="0"/>
+            </a:spcBef>
+            <a:spcAft>
+              <a:spcPct val="15000"/>
+            </a:spcAft>
+            <a:buChar char="••"/>
+          </a:pPr>
+          <a:r>
+            <a:rPr lang="en-US" altLang="ko-KR" sz="1400" kern="1200" dirty="0" smtClean="0"/>
+            <a:t>No(PK, NN, AI, INT), </a:t>
+          </a:r>
+          <a:r>
+            <a:rPr lang="en-US" altLang="ko-KR" sz="1400" kern="1200" dirty="0" err="1" smtClean="0"/>
+            <a:t>DateTime</a:t>
+          </a:r>
+          <a:r>
+            <a:rPr lang="en-US" altLang="ko-KR" sz="1400" kern="1200" dirty="0" smtClean="0"/>
+            <a:t>(NN, DATETIME), </a:t>
+          </a:r>
+          <a:r>
+            <a:rPr lang="en-US" altLang="ko-KR" sz="1400" kern="1200" dirty="0" err="1" smtClean="0"/>
+            <a:t>SensorName</a:t>
+          </a:r>
+          <a:r>
+            <a:rPr lang="en-US" altLang="ko-KR" sz="1400" kern="1200" dirty="0" smtClean="0"/>
+            <a:t>(NN, VARCHAR), </a:t>
+          </a:r>
+          <a:r>
+            <a:rPr lang="en-US" altLang="ko-KR" sz="1400" kern="1200" dirty="0" err="1" smtClean="0"/>
+            <a:t>ErrorCount</a:t>
+          </a:r>
+          <a:r>
+            <a:rPr lang="en-US" altLang="ko-KR" sz="1400" kern="1200" dirty="0" smtClean="0"/>
+            <a:t>(NN, INT)</a:t>
+          </a:r>
+          <a:endParaRPr lang="en-US" altLang="ko-KR" sz="1400" kern="1200" dirty="0" smtClean="0"/>
         </a:p>
       </dsp:txBody>
       <dsp:txXfrm>
-        <a:off x="0" y="434884"/>
-        <a:ext cx="10835640" cy="5380200"/>
+        <a:off x="0" y="576632"/>
+        <a:ext cx="10835640" cy="5216400"/>
       </dsp:txXfrm>
     </dsp:sp>
     <dsp:sp modelId="{D35A0036-4950-4ED1-9FBB-2058D41D07BF}">
@@ -1888,8 +2198,8 @@
       </dsp:nvSpPr>
       <dsp:spPr>
         <a:xfrm>
-          <a:off x="541782" y="15951"/>
-          <a:ext cx="2609070" cy="625573"/>
+          <a:off x="541782" y="38003"/>
+          <a:ext cx="2609070" cy="804309"/>
         </a:xfrm>
         <a:prstGeom prst="roundRect">
           <a:avLst/>
@@ -1982,8 +2292,8 @@
         </a:p>
       </dsp:txBody>
       <dsp:txXfrm>
-        <a:off x="572320" y="46489"/>
-        <a:ext cx="2547994" cy="564497"/>
+        <a:off x="581045" y="77266"/>
+        <a:ext cx="2530544" cy="725783"/>
       </dsp:txXfrm>
     </dsp:sp>
   </dsp:spTree>
@@ -3380,7 +3690,7 @@
           <a:p>
             <a:fld id="{04A9BD5A-8F9B-4A18-830E-D48E1EC465FC}" type="datetimeFigureOut">
               <a:rPr lang="ko-KR" altLang="en-US" smtClean="0"/>
-              <a:t>2021-11-08</a:t>
+              <a:t>2021-11-10</a:t>
             </a:fld>
             <a:endParaRPr lang="ko-KR" altLang="en-US"/>
           </a:p>
@@ -3550,7 +3860,7 @@
           <a:p>
             <a:fld id="{04A9BD5A-8F9B-4A18-830E-D48E1EC465FC}" type="datetimeFigureOut">
               <a:rPr lang="ko-KR" altLang="en-US" smtClean="0"/>
-              <a:t>2021-11-08</a:t>
+              <a:t>2021-11-10</a:t>
             </a:fld>
             <a:endParaRPr lang="ko-KR" altLang="en-US"/>
           </a:p>
@@ -3730,7 +4040,7 @@
           <a:p>
             <a:fld id="{04A9BD5A-8F9B-4A18-830E-D48E1EC465FC}" type="datetimeFigureOut">
               <a:rPr lang="ko-KR" altLang="en-US" smtClean="0"/>
-              <a:t>2021-11-08</a:t>
+              <a:t>2021-11-10</a:t>
             </a:fld>
             <a:endParaRPr lang="ko-KR" altLang="en-US"/>
           </a:p>
@@ -3900,7 +4210,7 @@
           <a:p>
             <a:fld id="{04A9BD5A-8F9B-4A18-830E-D48E1EC465FC}" type="datetimeFigureOut">
               <a:rPr lang="ko-KR" altLang="en-US" smtClean="0"/>
-              <a:t>2021-11-08</a:t>
+              <a:t>2021-11-10</a:t>
             </a:fld>
             <a:endParaRPr lang="ko-KR" altLang="en-US"/>
           </a:p>
@@ -4146,7 +4456,7 @@
           <a:p>
             <a:fld id="{04A9BD5A-8F9B-4A18-830E-D48E1EC465FC}" type="datetimeFigureOut">
               <a:rPr lang="ko-KR" altLang="en-US" smtClean="0"/>
-              <a:t>2021-11-08</a:t>
+              <a:t>2021-11-10</a:t>
             </a:fld>
             <a:endParaRPr lang="ko-KR" altLang="en-US"/>
           </a:p>
@@ -4378,7 +4688,7 @@
           <a:p>
             <a:fld id="{04A9BD5A-8F9B-4A18-830E-D48E1EC465FC}" type="datetimeFigureOut">
               <a:rPr lang="ko-KR" altLang="en-US" smtClean="0"/>
-              <a:t>2021-11-08</a:t>
+              <a:t>2021-11-10</a:t>
             </a:fld>
             <a:endParaRPr lang="ko-KR" altLang="en-US"/>
           </a:p>
@@ -4745,7 +5055,7 @@
           <a:p>
             <a:fld id="{04A9BD5A-8F9B-4A18-830E-D48E1EC465FC}" type="datetimeFigureOut">
               <a:rPr lang="ko-KR" altLang="en-US" smtClean="0"/>
-              <a:t>2021-11-08</a:t>
+              <a:t>2021-11-10</a:t>
             </a:fld>
             <a:endParaRPr lang="ko-KR" altLang="en-US"/>
           </a:p>
@@ -4863,7 +5173,7 @@
           <a:p>
             <a:fld id="{04A9BD5A-8F9B-4A18-830E-D48E1EC465FC}" type="datetimeFigureOut">
               <a:rPr lang="ko-KR" altLang="en-US" smtClean="0"/>
-              <a:t>2021-11-08</a:t>
+              <a:t>2021-11-10</a:t>
             </a:fld>
             <a:endParaRPr lang="ko-KR" altLang="en-US"/>
           </a:p>
@@ -4958,7 +5268,7 @@
           <a:p>
             <a:fld id="{04A9BD5A-8F9B-4A18-830E-D48E1EC465FC}" type="datetimeFigureOut">
               <a:rPr lang="ko-KR" altLang="en-US" smtClean="0"/>
-              <a:t>2021-11-08</a:t>
+              <a:t>2021-11-10</a:t>
             </a:fld>
             <a:endParaRPr lang="ko-KR" altLang="en-US"/>
           </a:p>
@@ -5235,7 +5545,7 @@
           <a:p>
             <a:fld id="{04A9BD5A-8F9B-4A18-830E-D48E1EC465FC}" type="datetimeFigureOut">
               <a:rPr lang="ko-KR" altLang="en-US" smtClean="0"/>
-              <a:t>2021-11-08</a:t>
+              <a:t>2021-11-10</a:t>
             </a:fld>
             <a:endParaRPr lang="ko-KR" altLang="en-US"/>
           </a:p>
@@ -5488,7 +5798,7 @@
           <a:p>
             <a:fld id="{04A9BD5A-8F9B-4A18-830E-D48E1EC465FC}" type="datetimeFigureOut">
               <a:rPr lang="ko-KR" altLang="en-US" smtClean="0"/>
-              <a:t>2021-11-08</a:t>
+              <a:t>2021-11-10</a:t>
             </a:fld>
             <a:endParaRPr lang="ko-KR" altLang="en-US"/>
           </a:p>
@@ -5701,7 +6011,7 @@
           <a:p>
             <a:fld id="{04A9BD5A-8F9B-4A18-830E-D48E1EC465FC}" type="datetimeFigureOut">
               <a:rPr lang="ko-KR" altLang="en-US" smtClean="0"/>
-              <a:t>2021-11-08</a:t>
+              <a:t>2021-11-10</a:t>
             </a:fld>
             <a:endParaRPr lang="ko-KR" altLang="en-US"/>
           </a:p>
@@ -6165,6 +6475,323 @@
 </p:sld>
 </file>
 
+<file path=ppt/slides/slide10.xml><?xml version="1.0" encoding="utf-8"?>
+<p:sld xmlns:a="http://schemas.openxmlformats.org/drawingml/2006/main" xmlns:r="http://schemas.openxmlformats.org/officeDocument/2006/relationships" xmlns:p="http://schemas.openxmlformats.org/presentationml/2006/main">
+  <p:cSld>
+    <p:spTree>
+      <p:nvGrpSpPr>
+        <p:cNvPr id="1" name=""/>
+        <p:cNvGrpSpPr/>
+        <p:nvPr/>
+      </p:nvGrpSpPr>
+      <p:grpSpPr>
+        <a:xfrm>
+          <a:off x="0" y="0"/>
+          <a:ext cx="0" cy="0"/>
+          <a:chOff x="0" y="0"/>
+          <a:chExt cx="0" cy="0"/>
+        </a:xfrm>
+      </p:grpSpPr>
+      <p:pic>
+        <p:nvPicPr>
+          <p:cNvPr id="6" name="그림 5"/>
+          <p:cNvPicPr>
+            <a:picLocks noChangeAspect="1"/>
+          </p:cNvPicPr>
+          <p:nvPr/>
+        </p:nvPicPr>
+        <p:blipFill>
+          <a:blip r:embed="rId2"/>
+          <a:stretch>
+            <a:fillRect/>
+          </a:stretch>
+        </p:blipFill>
+        <p:spPr>
+          <a:xfrm>
+            <a:off x="714808" y="827347"/>
+            <a:ext cx="10756666" cy="5633133"/>
+          </a:xfrm>
+          <a:prstGeom prst="rect">
+            <a:avLst/>
+          </a:prstGeom>
+        </p:spPr>
+      </p:pic>
+      <p:sp>
+        <p:nvSpPr>
+          <p:cNvPr id="5" name="제목 1"/>
+          <p:cNvSpPr txBox="1">
+            <a:spLocks/>
+          </p:cNvSpPr>
+          <p:nvPr/>
+        </p:nvSpPr>
+        <p:spPr>
+          <a:xfrm>
+            <a:off x="0" y="1"/>
+            <a:ext cx="9509760" cy="827346"/>
+          </a:xfrm>
+          <a:prstGeom prst="rect">
+            <a:avLst/>
+          </a:prstGeom>
+        </p:spPr>
+        <p:txBody>
+          <a:bodyPr vert="horz" lIns="91440" tIns="45720" rIns="91440" bIns="45720" rtlCol="0" anchor="ctr">
+            <a:normAutofit/>
+          </a:bodyPr>
+          <a:lstStyle>
+            <a:lvl1pPr algn="l" defTabSz="914400" rtl="0" eaLnBrk="1" latinLnBrk="1" hangingPunct="1">
+              <a:lnSpc>
+                <a:spcPct val="90000"/>
+              </a:lnSpc>
+              <a:spcBef>
+                <a:spcPct val="0"/>
+              </a:spcBef>
+              <a:buNone/>
+              <a:defRPr sz="4400" kern="1200">
+                <a:solidFill>
+                  <a:schemeClr val="tx1"/>
+                </a:solidFill>
+                <a:latin typeface="+mj-lt"/>
+                <a:ea typeface="+mj-ea"/>
+                <a:cs typeface="+mj-cs"/>
+              </a:defRPr>
+            </a:lvl1pPr>
+          </a:lstStyle>
+          <a:p>
+            <a:r>
+              <a:rPr lang="en-US" altLang="ko-KR" sz="3200" dirty="0" smtClean="0"/>
+              <a:t>  UI </a:t>
+            </a:r>
+            <a:r>
+              <a:rPr lang="ko-KR" altLang="en-US" sz="3200" dirty="0" smtClean="0"/>
+              <a:t>설계 </a:t>
+            </a:r>
+            <a:r>
+              <a:rPr lang="en-US" altLang="ko-KR" sz="3200" dirty="0" smtClean="0"/>
+              <a:t>– </a:t>
+            </a:r>
+            <a:r>
+              <a:rPr lang="ko-KR" altLang="en-US" sz="3200" dirty="0" smtClean="0"/>
+              <a:t>장비 가동 시간</a:t>
+            </a:r>
+            <a:endParaRPr lang="ko-KR" altLang="en-US" sz="3200" dirty="0"/>
+          </a:p>
+        </p:txBody>
+      </p:sp>
+      <p:sp>
+        <p:nvSpPr>
+          <p:cNvPr id="4" name="TextBox 3"/>
+          <p:cNvSpPr txBox="1"/>
+          <p:nvPr/>
+        </p:nvSpPr>
+        <p:spPr>
+          <a:xfrm>
+            <a:off x="8882304" y="5659653"/>
+            <a:ext cx="2589170" cy="369332"/>
+          </a:xfrm>
+          <a:prstGeom prst="rect">
+            <a:avLst/>
+          </a:prstGeom>
+          <a:solidFill>
+            <a:schemeClr val="bg1"/>
+          </a:solidFill>
+          <a:ln>
+            <a:solidFill>
+              <a:srgbClr val="FF0000"/>
+            </a:solidFill>
+          </a:ln>
+          <a:effectLst>
+            <a:outerShdw blurRad="50800" dist="38100" dir="5400000" algn="t" rotWithShape="0">
+              <a:prstClr val="black">
+                <a:alpha val="40000"/>
+              </a:prstClr>
+            </a:outerShdw>
+          </a:effectLst>
+        </p:spPr>
+        <p:txBody>
+          <a:bodyPr wrap="none" rtlCol="0">
+            <a:spAutoFit/>
+          </a:bodyPr>
+          <a:lstStyle/>
+          <a:p>
+            <a:r>
+              <a:rPr lang="ko-KR" altLang="en-US" dirty="0" smtClean="0">
+                <a:solidFill>
+                  <a:srgbClr val="FF0000"/>
+                </a:solidFill>
+              </a:rPr>
+              <a:t>날짜 선택 후 버튼 클릭</a:t>
+            </a:r>
+            <a:endParaRPr lang="ko-KR" altLang="en-US" dirty="0">
+              <a:solidFill>
+                <a:srgbClr val="FF0000"/>
+              </a:solidFill>
+            </a:endParaRPr>
+          </a:p>
+        </p:txBody>
+      </p:sp>
+      <p:sp>
+        <p:nvSpPr>
+          <p:cNvPr id="7" name="TextBox 6"/>
+          <p:cNvSpPr txBox="1"/>
+          <p:nvPr/>
+        </p:nvSpPr>
+        <p:spPr>
+          <a:xfrm>
+            <a:off x="909378" y="4456495"/>
+            <a:ext cx="2589170" cy="369332"/>
+          </a:xfrm>
+          <a:prstGeom prst="rect">
+            <a:avLst/>
+          </a:prstGeom>
+          <a:solidFill>
+            <a:schemeClr val="bg1"/>
+          </a:solidFill>
+          <a:ln>
+            <a:solidFill>
+              <a:srgbClr val="FF0000"/>
+            </a:solidFill>
+          </a:ln>
+          <a:effectLst>
+            <a:outerShdw blurRad="50800" dist="38100" dir="5400000" algn="t" rotWithShape="0">
+              <a:prstClr val="black">
+                <a:alpha val="40000"/>
+              </a:prstClr>
+            </a:outerShdw>
+          </a:effectLst>
+        </p:spPr>
+        <p:txBody>
+          <a:bodyPr wrap="none" rtlCol="0">
+            <a:spAutoFit/>
+          </a:bodyPr>
+          <a:lstStyle/>
+          <a:p>
+            <a:r>
+              <a:rPr lang="ko-KR" altLang="en-US" dirty="0" smtClean="0">
+                <a:solidFill>
+                  <a:srgbClr val="FF0000"/>
+                </a:solidFill>
+              </a:rPr>
+              <a:t>기간 내 누적 시간 조회</a:t>
+            </a:r>
+            <a:endParaRPr lang="ko-KR" altLang="en-US" dirty="0">
+              <a:solidFill>
+                <a:srgbClr val="FF0000"/>
+              </a:solidFill>
+            </a:endParaRPr>
+          </a:p>
+        </p:txBody>
+      </p:sp>
+      <p:cxnSp>
+        <p:nvCxnSpPr>
+          <p:cNvPr id="9" name="꺾인 연결선 8"/>
+          <p:cNvCxnSpPr>
+            <a:stCxn id="4" idx="1"/>
+            <a:endCxn id="7" idx="2"/>
+          </p:cNvCxnSpPr>
+          <p:nvPr/>
+        </p:nvCxnSpPr>
+        <p:spPr>
+          <a:xfrm rot="10800000">
+            <a:off x="2203964" y="4825827"/>
+            <a:ext cx="6678341" cy="1018492"/>
+          </a:xfrm>
+          <a:prstGeom prst="bentConnector2">
+            <a:avLst/>
+          </a:prstGeom>
+          <a:ln>
+            <a:solidFill>
+              <a:srgbClr val="FF0000"/>
+            </a:solidFill>
+            <a:tailEnd type="triangle"/>
+          </a:ln>
+          <a:effectLst>
+            <a:outerShdw blurRad="50800" dist="38100" dir="5400000" algn="t" rotWithShape="0">
+              <a:prstClr val="black">
+                <a:alpha val="40000"/>
+              </a:prstClr>
+            </a:outerShdw>
+          </a:effectLst>
+        </p:spPr>
+        <p:style>
+          <a:lnRef idx="1">
+            <a:schemeClr val="accent1"/>
+          </a:lnRef>
+          <a:fillRef idx="0">
+            <a:schemeClr val="accent1"/>
+          </a:fillRef>
+          <a:effectRef idx="0">
+            <a:schemeClr val="accent1"/>
+          </a:effectRef>
+          <a:fontRef idx="minor">
+            <a:schemeClr val="tx1"/>
+          </a:fontRef>
+        </p:style>
+      </p:cxnSp>
+      <p:sp>
+        <p:nvSpPr>
+          <p:cNvPr id="12" name="TextBox 11"/>
+          <p:cNvSpPr txBox="1"/>
+          <p:nvPr/>
+        </p:nvSpPr>
+        <p:spPr>
+          <a:xfrm>
+            <a:off x="909378" y="1132675"/>
+            <a:ext cx="3876382" cy="369332"/>
+          </a:xfrm>
+          <a:prstGeom prst="rect">
+            <a:avLst/>
+          </a:prstGeom>
+          <a:solidFill>
+            <a:schemeClr val="bg1"/>
+          </a:solidFill>
+          <a:ln>
+            <a:solidFill>
+              <a:srgbClr val="FF0000"/>
+            </a:solidFill>
+          </a:ln>
+          <a:effectLst>
+            <a:outerShdw blurRad="50800" dist="38100" dir="5400000" algn="t" rotWithShape="0">
+              <a:prstClr val="black">
+                <a:alpha val="40000"/>
+              </a:prstClr>
+            </a:outerShdw>
+          </a:effectLst>
+        </p:spPr>
+        <p:txBody>
+          <a:bodyPr wrap="none" rtlCol="0">
+            <a:spAutoFit/>
+          </a:bodyPr>
+          <a:lstStyle/>
+          <a:p>
+            <a:r>
+              <a:rPr lang="ko-KR" altLang="en-US" dirty="0" smtClean="0">
+                <a:solidFill>
+                  <a:srgbClr val="FF0000"/>
+                </a:solidFill>
+              </a:rPr>
+              <a:t>장비가 켜지고 꺼질 때 데이터 갱신</a:t>
+            </a:r>
+            <a:endParaRPr lang="ko-KR" altLang="en-US" dirty="0">
+              <a:solidFill>
+                <a:srgbClr val="FF0000"/>
+              </a:solidFill>
+            </a:endParaRPr>
+          </a:p>
+        </p:txBody>
+      </p:sp>
+    </p:spTree>
+    <p:extLst>
+      <p:ext uri="{BB962C8B-B14F-4D97-AF65-F5344CB8AC3E}">
+        <p14:creationId xmlns:p14="http://schemas.microsoft.com/office/powerpoint/2010/main" val="1940417610"/>
+      </p:ext>
+    </p:extLst>
+  </p:cSld>
+  <p:clrMapOvr>
+    <a:masterClrMapping/>
+  </p:clrMapOvr>
+</p:sld>
+</file>
+
 <file path=ppt/slides/slide2.xml><?xml version="1.0" encoding="utf-8"?>
 <p:sld xmlns:a="http://schemas.openxmlformats.org/drawingml/2006/main" xmlns:r="http://schemas.openxmlformats.org/officeDocument/2006/relationships" xmlns:p="http://schemas.openxmlformats.org/presentationml/2006/main">
   <p:cSld>
@@ -6423,12 +7050,70 @@
         </p:nvSpPr>
         <p:spPr/>
         <p:txBody>
-          <a:bodyPr/>
+          <a:bodyPr>
+            <a:normAutofit lnSpcReduction="10000"/>
+          </a:bodyPr>
           <a:lstStyle/>
           <a:p>
             <a:r>
               <a:rPr lang="ko-KR" altLang="en-US" dirty="0" smtClean="0"/>
-              <a:t>재고 현황 관리 기능 필요</a:t>
+              <a:t>재고 현황 관리 기능 </a:t>
+            </a:r>
+            <a:r>
+              <a:rPr lang="ko-KR" altLang="en-US" dirty="0" smtClean="0"/>
+              <a:t>필요</a:t>
+            </a:r>
+            <a:endParaRPr lang="en-US" altLang="ko-KR" dirty="0" smtClean="0"/>
+          </a:p>
+          <a:p>
+            <a:pPr lvl="1"/>
+            <a:r>
+              <a:rPr lang="ko-KR" altLang="en-US" dirty="0" smtClean="0"/>
+              <a:t>등록</a:t>
+            </a:r>
+            <a:endParaRPr lang="en-US" altLang="ko-KR" dirty="0" smtClean="0"/>
+          </a:p>
+          <a:p>
+            <a:pPr lvl="2"/>
+            <a:r>
+              <a:rPr lang="ko-KR" altLang="en-US" dirty="0" smtClean="0"/>
+              <a:t>제품번호</a:t>
+            </a:r>
+            <a:r>
+              <a:rPr lang="en-US" altLang="ko-KR" dirty="0" smtClean="0"/>
+              <a:t>, </a:t>
+            </a:r>
+            <a:r>
+              <a:rPr lang="ko-KR" altLang="en-US" dirty="0" smtClean="0"/>
+              <a:t>이름</a:t>
+            </a:r>
+            <a:r>
+              <a:rPr lang="en-US" altLang="ko-KR" dirty="0" smtClean="0"/>
+              <a:t>, </a:t>
+            </a:r>
+            <a:r>
+              <a:rPr lang="ko-KR" altLang="en-US" dirty="0" smtClean="0"/>
+              <a:t>회사 등의 데이터를 입력 후 등록</a:t>
+            </a:r>
+            <a:endParaRPr lang="en-US" altLang="ko-KR" dirty="0" smtClean="0"/>
+          </a:p>
+          <a:p>
+            <a:pPr lvl="2"/>
+            <a:r>
+              <a:rPr lang="ko-KR" altLang="en-US" dirty="0" smtClean="0"/>
+              <a:t>등록된 데이터들은 조회가 가능</a:t>
+            </a:r>
+            <a:endParaRPr lang="en-US" altLang="ko-KR" dirty="0" smtClean="0"/>
+          </a:p>
+          <a:p>
+            <a:pPr lvl="2"/>
+            <a:r>
+              <a:rPr lang="ko-KR" altLang="en-US" dirty="0" smtClean="0"/>
+              <a:t>제품 번호는 중복이 불가능하다</a:t>
+            </a:r>
+            <a:r>
+              <a:rPr lang="en-US" altLang="ko-KR" dirty="0" smtClean="0"/>
+              <a:t>.</a:t>
             </a:r>
             <a:endParaRPr lang="en-US" altLang="ko-KR" dirty="0" smtClean="0"/>
           </a:p>
@@ -6438,13 +7123,79 @@
               <a:rPr lang="ko-KR" altLang="en-US" dirty="0" smtClean="0"/>
               <a:t>입고</a:t>
             </a:r>
+            <a:endParaRPr lang="en-US" altLang="ko-KR" dirty="0" smtClean="0"/>
+          </a:p>
+          <a:p>
+            <a:pPr lvl="2"/>
+            <a:r>
+              <a:rPr lang="ko-KR" altLang="en-US" dirty="0" smtClean="0"/>
+              <a:t>등록된 제품을 조회하여 원하는 제품을 선택해 추가 입고를 할 수 있다</a:t>
+            </a:r>
+            <a:r>
+              <a:rPr lang="en-US" altLang="ko-KR" dirty="0" smtClean="0"/>
+              <a:t>.</a:t>
+            </a:r>
+          </a:p>
+          <a:p>
+            <a:pPr lvl="2"/>
+            <a:r>
+              <a:rPr lang="ko-KR" altLang="en-US" dirty="0" smtClean="0"/>
+              <a:t>입고 수량에 제한은 따로 없음</a:t>
+            </a:r>
+            <a:endParaRPr lang="en-US" altLang="ko-KR" dirty="0" smtClean="0"/>
+          </a:p>
+          <a:p>
+            <a:pPr lvl="1"/>
+            <a:r>
+              <a:rPr lang="ko-KR" altLang="en-US" dirty="0" smtClean="0"/>
+              <a:t>출고</a:t>
+            </a:r>
+            <a:endParaRPr lang="en-US" altLang="ko-KR" dirty="0" smtClean="0"/>
+          </a:p>
+          <a:p>
+            <a:pPr lvl="2"/>
+            <a:r>
+              <a:rPr lang="ko-KR" altLang="en-US" dirty="0" smtClean="0"/>
+              <a:t>등록된 제품을 조회</a:t>
+            </a:r>
             <a:r>
               <a:rPr lang="en-US" altLang="ko-KR" dirty="0" smtClean="0"/>
               <a:t>, </a:t>
             </a:r>
             <a:r>
               <a:rPr lang="ko-KR" altLang="en-US" dirty="0" smtClean="0"/>
-              <a:t>출고</a:t>
+              <a:t>원하는 제품을 선택해 출고를 </a:t>
+            </a:r>
+            <a:r>
+              <a:rPr lang="ko-KR" altLang="en-US" dirty="0" smtClean="0"/>
+              <a:t>할 수 있다</a:t>
+            </a:r>
+            <a:r>
+              <a:rPr lang="en-US" altLang="ko-KR" dirty="0" smtClean="0"/>
+              <a:t>.</a:t>
+            </a:r>
+          </a:p>
+          <a:p>
+            <a:pPr lvl="2"/>
+            <a:r>
+              <a:rPr lang="ko-KR" altLang="en-US" dirty="0" smtClean="0"/>
+              <a:t>출고 수량은 남은 재고보다 적거나 같아야 함</a:t>
+            </a:r>
+            <a:endParaRPr lang="en-US" altLang="ko-KR" dirty="0" smtClean="0"/>
+          </a:p>
+          <a:p>
+            <a:pPr lvl="1"/>
+            <a:r>
+              <a:rPr lang="ko-KR" altLang="en-US" dirty="0" smtClean="0"/>
+              <a:t>조회</a:t>
+            </a:r>
+            <a:endParaRPr lang="en-US" altLang="ko-KR" dirty="0" smtClean="0"/>
+          </a:p>
+          <a:p>
+            <a:pPr lvl="2"/>
+            <a:r>
+              <a:rPr lang="ko-KR" altLang="en-US" dirty="0" smtClean="0"/>
+              <a:t>재고를 조회</a:t>
             </a:r>
             <a:r>
               <a:rPr lang="en-US" altLang="ko-KR" dirty="0" smtClean="0"/>
@@ -6452,7 +7203,7 @@
             </a:r>
             <a:r>
               <a:rPr lang="ko-KR" altLang="en-US" dirty="0" smtClean="0"/>
-              <a:t>조회</a:t>
+              <a:t>이름 조회</a:t>
             </a:r>
             <a:r>
               <a:rPr lang="en-US" altLang="ko-KR" dirty="0" smtClean="0"/>
@@ -6460,50 +7211,7 @@
             </a:r>
             <a:r>
               <a:rPr lang="ko-KR" altLang="en-US" dirty="0" smtClean="0"/>
-              <a:t>등록</a:t>
-            </a:r>
-            <a:endParaRPr lang="en-US" altLang="ko-KR" dirty="0" smtClean="0"/>
-          </a:p>
-          <a:p>
-            <a:r>
-              <a:rPr lang="ko-KR" altLang="en-US" dirty="0" smtClean="0"/>
-              <a:t>가동중인 장비 상태 확인 필요</a:t>
-            </a:r>
-            <a:endParaRPr lang="en-US" altLang="ko-KR" dirty="0" smtClean="0"/>
-          </a:p>
-          <a:p>
-            <a:pPr lvl="1"/>
-            <a:r>
-              <a:rPr lang="ko-KR" altLang="en-US" dirty="0" smtClean="0"/>
-              <a:t>장비 원격 제어</a:t>
-            </a:r>
-            <a:endParaRPr lang="en-US" altLang="ko-KR" dirty="0" smtClean="0"/>
-          </a:p>
-          <a:p>
-            <a:pPr lvl="1"/>
-            <a:r>
-              <a:rPr lang="ko-KR" altLang="en-US" dirty="0" smtClean="0"/>
-              <a:t>가동 시간 및 가동 상태</a:t>
-            </a:r>
-            <a:endParaRPr lang="en-US" altLang="ko-KR" dirty="0" smtClean="0"/>
-          </a:p>
-          <a:p>
-            <a:pPr lvl="1"/>
-            <a:r>
-              <a:rPr lang="ko-KR" altLang="en-US" dirty="0" smtClean="0"/>
-              <a:t>센서 오류 횟수 통계 </a:t>
-            </a:r>
-            <a:r>
-              <a:rPr lang="en-US" altLang="ko-KR" dirty="0" smtClean="0"/>
-              <a:t>(</a:t>
-            </a:r>
-            <a:r>
-              <a:rPr lang="ko-KR" altLang="en-US" dirty="0" smtClean="0"/>
-              <a:t>스위치로 대체</a:t>
-            </a:r>
-            <a:r>
-              <a:rPr lang="en-US" altLang="ko-KR" dirty="0" smtClean="0"/>
-              <a:t>)</a:t>
+              <a:t>번호 조회 등 유용한 조회 기능을 추가</a:t>
             </a:r>
             <a:endParaRPr lang="ko-KR" altLang="en-US" dirty="0"/>
           </a:p>
@@ -6512,7 +7220,7 @@
     </p:spTree>
     <p:extLst>
       <p:ext uri="{BB962C8B-B14F-4D97-AF65-F5344CB8AC3E}">
-        <p14:creationId xmlns:p14="http://schemas.microsoft.com/office/powerpoint/2010/main" val="1929479954"/>
+        <p14:creationId xmlns:p14="http://schemas.microsoft.com/office/powerpoint/2010/main" val="4070719168"/>
       </p:ext>
     </p:extLst>
   </p:cSld>
@@ -6563,7 +7271,7 @@
           <a:p>
             <a:r>
               <a:rPr lang="ko-KR" altLang="en-US" dirty="0" smtClean="0"/>
-              <a:t>개발 환경</a:t>
+              <a:t>요구사항 분석</a:t>
             </a:r>
             <a:endParaRPr lang="ko-KR" altLang="en-US" dirty="0"/>
           </a:p>
@@ -6585,30 +7293,167 @@
           <a:lstStyle/>
           <a:p>
             <a:r>
+              <a:rPr lang="ko-KR" altLang="en-US" dirty="0" smtClean="0"/>
+              <a:t>가동중인 </a:t>
+            </a:r>
+            <a:r>
+              <a:rPr lang="ko-KR" altLang="en-US" dirty="0" smtClean="0"/>
+              <a:t>장비 상태 확인 필요</a:t>
+            </a:r>
+            <a:endParaRPr lang="en-US" altLang="ko-KR" dirty="0" smtClean="0"/>
+          </a:p>
+          <a:p>
+            <a:pPr lvl="1"/>
+            <a:r>
+              <a:rPr lang="ko-KR" altLang="en-US" dirty="0" smtClean="0"/>
+              <a:t>장비 원격 </a:t>
+            </a:r>
+            <a:r>
+              <a:rPr lang="ko-KR" altLang="en-US" dirty="0" smtClean="0"/>
+              <a:t>제어</a:t>
+            </a:r>
+            <a:endParaRPr lang="en-US" altLang="ko-KR" dirty="0" smtClean="0"/>
+          </a:p>
+          <a:p>
+            <a:pPr lvl="2"/>
+            <a:r>
+              <a:rPr lang="ko-KR" altLang="en-US" dirty="0" smtClean="0"/>
+              <a:t>모니터링 화면에서 장비 </a:t>
+            </a:r>
+            <a:r>
               <a:rPr lang="en-US" altLang="ko-KR" dirty="0" smtClean="0"/>
-              <a:t>OS: Windows 10 Pro 64bit</a:t>
-            </a:r>
-          </a:p>
-          <a:p>
+              <a:t>on/off </a:t>
+            </a:r>
+            <a:r>
+              <a:rPr lang="ko-KR" altLang="en-US" dirty="0" smtClean="0"/>
+              <a:t>가능</a:t>
+            </a:r>
             <a:r>
               <a:rPr lang="en-US" altLang="ko-KR" dirty="0" smtClean="0"/>
-              <a:t>Tools: Visual Studio community 2019 C# Window Form</a:t>
-            </a:r>
-          </a:p>
-          <a:p>
+              <a:t>.</a:t>
+            </a:r>
+            <a:r>
+              <a:rPr lang="ko-KR" altLang="en-US" dirty="0" smtClean="0"/>
+              <a:t> </a:t>
+            </a:r>
+            <a:endParaRPr lang="en-US" altLang="ko-KR" dirty="0" smtClean="0"/>
+          </a:p>
+          <a:p>
+            <a:pPr lvl="2"/>
             <a:r>
               <a:rPr lang="en-US" altLang="ko-KR" dirty="0" smtClean="0"/>
-              <a:t>LANG: C#</a:t>
-            </a:r>
-          </a:p>
-          <a:p>
+              <a:t>on/off </a:t>
+            </a:r>
+            <a:r>
+              <a:rPr lang="ko-KR" altLang="en-US" dirty="0" smtClean="0"/>
+              <a:t>시에 </a:t>
+            </a:r>
+            <a:r>
+              <a:rPr lang="ko-KR" altLang="en-US" dirty="0" smtClean="0"/>
+              <a:t>켜진 시간</a:t>
+            </a:r>
             <a:r>
               <a:rPr lang="en-US" altLang="ko-KR" dirty="0" smtClean="0"/>
-              <a:t>Arduino UNO </a:t>
-            </a:r>
-            <a:r>
-              <a:rPr lang="en-US" altLang="ko-KR" dirty="0" err="1" smtClean="0"/>
-              <a:t>borad</a:t>
+              <a:t>, </a:t>
+            </a:r>
+            <a:r>
+              <a:rPr lang="ko-KR" altLang="en-US" dirty="0" smtClean="0"/>
+              <a:t>꺼진 시간 기록</a:t>
+            </a:r>
+            <a:endParaRPr lang="en-US" altLang="ko-KR" dirty="0" smtClean="0"/>
+          </a:p>
+          <a:p>
+            <a:pPr lvl="1"/>
+            <a:r>
+              <a:rPr lang="ko-KR" altLang="en-US" dirty="0" smtClean="0"/>
+              <a:t>가동 시간 및 가동 </a:t>
+            </a:r>
+            <a:r>
+              <a:rPr lang="ko-KR" altLang="en-US" dirty="0" smtClean="0"/>
+              <a:t>상태</a:t>
+            </a:r>
+            <a:endParaRPr lang="en-US" altLang="ko-KR" dirty="0" smtClean="0"/>
+          </a:p>
+          <a:p>
+            <a:pPr lvl="2"/>
+            <a:r>
+              <a:rPr lang="ko-KR" altLang="en-US" dirty="0" smtClean="0"/>
+              <a:t>켜진 시간</a:t>
+            </a:r>
+            <a:r>
+              <a:rPr lang="en-US" altLang="ko-KR" dirty="0" smtClean="0"/>
+              <a:t>, </a:t>
+            </a:r>
+            <a:r>
+              <a:rPr lang="ko-KR" altLang="en-US" dirty="0" smtClean="0"/>
+              <a:t>꺼진 시간 활용</a:t>
+            </a:r>
+            <a:r>
+              <a:rPr lang="en-US" altLang="ko-KR" dirty="0" smtClean="0"/>
+              <a:t>, </a:t>
+            </a:r>
+            <a:r>
+              <a:rPr lang="ko-KR" altLang="en-US" dirty="0" smtClean="0"/>
+              <a:t>총 가동 시간을 계산</a:t>
+            </a:r>
+            <a:endParaRPr lang="en-US" altLang="ko-KR" dirty="0" smtClean="0"/>
+          </a:p>
+          <a:p>
+            <a:pPr lvl="2"/>
+            <a:r>
+              <a:rPr lang="ko-KR" altLang="en-US" dirty="0" smtClean="0"/>
+              <a:t>날짜를 입력해 특정 기간의 가동시간을 조회할 수 있어야함</a:t>
+            </a:r>
+            <a:endParaRPr lang="en-US" altLang="ko-KR" dirty="0" smtClean="0"/>
+          </a:p>
+          <a:p>
+            <a:pPr lvl="1"/>
+            <a:r>
+              <a:rPr lang="ko-KR" altLang="en-US" dirty="0" smtClean="0"/>
+              <a:t>센서 오류 횟수 통계 </a:t>
+            </a:r>
+            <a:r>
+              <a:rPr lang="en-US" altLang="ko-KR" dirty="0" smtClean="0"/>
+              <a:t>(</a:t>
+            </a:r>
+            <a:r>
+              <a:rPr lang="ko-KR" altLang="en-US" dirty="0" smtClean="0"/>
+              <a:t>스위치로 대체</a:t>
+            </a:r>
+            <a:r>
+              <a:rPr lang="en-US" altLang="ko-KR" dirty="0" smtClean="0"/>
+              <a:t>)</a:t>
+            </a:r>
+          </a:p>
+          <a:p>
+            <a:pPr lvl="2"/>
+            <a:r>
+              <a:rPr lang="ko-KR" altLang="en-US" dirty="0" smtClean="0"/>
+              <a:t>오류 메시지를 전송하면 시간 단위로 오류 횟수를 수집</a:t>
+            </a:r>
+            <a:endParaRPr lang="en-US" altLang="ko-KR" dirty="0" smtClean="0"/>
+          </a:p>
+          <a:p>
+            <a:pPr lvl="2"/>
+            <a:r>
+              <a:rPr lang="ko-KR" altLang="en-US" dirty="0" smtClean="0"/>
+              <a:t>수집된 오류 횟수를 시간 단위 그래프로 나타냄</a:t>
+            </a:r>
+            <a:endParaRPr lang="en-US" altLang="ko-KR" dirty="0" smtClean="0"/>
+          </a:p>
+          <a:p>
+            <a:pPr lvl="2"/>
+            <a:r>
+              <a:rPr lang="ko-KR" altLang="en-US" dirty="0" smtClean="0"/>
+              <a:t>날짜를 입력해 특정 기간 동안 발생한 </a:t>
+            </a:r>
+            <a:r>
+              <a:rPr lang="ko-KR" altLang="en-US" dirty="0" err="1" smtClean="0"/>
+              <a:t>오류횟수를</a:t>
+            </a:r>
+            <a:r>
+              <a:rPr lang="ko-KR" altLang="en-US" dirty="0" smtClean="0"/>
+              <a:t> 확인할 수 있어야함</a:t>
             </a:r>
             <a:endParaRPr lang="ko-KR" altLang="en-US" dirty="0"/>
           </a:p>
@@ -6617,7 +7462,7 @@
     </p:spTree>
     <p:extLst>
       <p:ext uri="{BB962C8B-B14F-4D97-AF65-F5344CB8AC3E}">
-        <p14:creationId xmlns:p14="http://schemas.microsoft.com/office/powerpoint/2010/main" val="1770829046"/>
+        <p14:creationId xmlns:p14="http://schemas.microsoft.com/office/powerpoint/2010/main" val="820379837"/>
       </p:ext>
     </p:extLst>
   </p:cSld>
@@ -6651,28 +7496,6 @@
           <a:chExt cx="0" cy="0"/>
         </a:xfrm>
       </p:grpSpPr>
-      <p:graphicFrame>
-        <p:nvGraphicFramePr>
-          <p:cNvPr id="7" name="다이어그램 6"/>
-          <p:cNvGraphicFramePr/>
-          <p:nvPr>
-            <p:extLst>
-              <p:ext uri="{D42A27DB-BD31-4B8C-83A1-F6EECF244321}">
-                <p14:modId xmlns:p14="http://schemas.microsoft.com/office/powerpoint/2010/main" val="2155510999"/>
-              </p:ext>
-            </p:extLst>
-          </p:nvPr>
-        </p:nvGraphicFramePr>
-        <p:xfrm>
-          <a:off x="838200" y="827346"/>
-          <a:ext cx="10835640" cy="5831036"/>
-        </p:xfrm>
-        <a:graphic>
-          <a:graphicData uri="http://schemas.openxmlformats.org/drawingml/2006/diagram">
-            <dgm:relIds xmlns:dgm="http://schemas.openxmlformats.org/drawingml/2006/diagram" xmlns:r="http://schemas.openxmlformats.org/officeDocument/2006/relationships" r:dm="rId2" r:lo="rId3" r:qs="rId4" r:cs="rId5"/>
-          </a:graphicData>
-        </a:graphic>
-      </p:graphicFrame>
       <p:sp>
         <p:nvSpPr>
           <p:cNvPr id="2" name="제목 1"/>
@@ -6683,34 +7506,81 @@
             <p:ph type="title"/>
           </p:nvPr>
         </p:nvSpPr>
+        <p:spPr/>
+        <p:txBody>
+          <a:bodyPr/>
+          <a:lstStyle/>
+          <a:p>
+            <a:r>
+              <a:rPr lang="ko-KR" altLang="en-US" dirty="0" smtClean="0"/>
+              <a:t>개발 환경</a:t>
+            </a:r>
+            <a:endParaRPr lang="ko-KR" altLang="en-US" dirty="0"/>
+          </a:p>
+        </p:txBody>
+      </p:sp>
+      <p:sp>
+        <p:nvSpPr>
+          <p:cNvPr id="3" name="내용 개체 틀 2"/>
+          <p:cNvSpPr>
+            <a:spLocks noGrp="1"/>
+          </p:cNvSpPr>
+          <p:nvPr>
+            <p:ph idx="1"/>
+          </p:nvPr>
+        </p:nvSpPr>
         <p:spPr>
           <a:xfrm>
-            <a:off x="0" y="1"/>
-            <a:ext cx="9509760" cy="827346"/>
+            <a:off x="838200" y="1825625"/>
+            <a:ext cx="10515600" cy="4351338"/>
           </a:xfrm>
         </p:spPr>
         <p:txBody>
-          <a:bodyPr>
-            <a:normAutofit/>
-          </a:bodyPr>
+          <a:bodyPr/>
           <a:lstStyle/>
           <a:p>
             <a:r>
-              <a:rPr lang="en-US" altLang="ko-KR" sz="3200" dirty="0" smtClean="0"/>
-              <a:t>  DB </a:t>
-            </a:r>
-            <a:r>
-              <a:rPr lang="ko-KR" altLang="en-US" sz="3200" dirty="0" smtClean="0"/>
-              <a:t>구성</a:t>
-            </a:r>
-            <a:endParaRPr lang="ko-KR" altLang="en-US" sz="3200" dirty="0"/>
+              <a:rPr lang="en-US" altLang="ko-KR" dirty="0" smtClean="0"/>
+              <a:t>OS: Windows 10 Pro 64bit</a:t>
+            </a:r>
+          </a:p>
+          <a:p>
+            <a:r>
+              <a:rPr lang="en-US" altLang="ko-KR" dirty="0" smtClean="0"/>
+              <a:t>Tools: Visual Studio community 2019 C# </a:t>
+            </a:r>
+            <a:r>
+              <a:rPr lang="en-US" altLang="ko-KR" dirty="0" smtClean="0"/>
+              <a:t>Windows </a:t>
+            </a:r>
+            <a:r>
+              <a:rPr lang="en-US" altLang="ko-KR" dirty="0" smtClean="0"/>
+              <a:t>Form</a:t>
+            </a:r>
+          </a:p>
+          <a:p>
+            <a:r>
+              <a:rPr lang="en-US" altLang="ko-KR" dirty="0" smtClean="0"/>
+              <a:t>LANG: C#</a:t>
+            </a:r>
+          </a:p>
+          <a:p>
+            <a:r>
+              <a:rPr lang="en-US" altLang="ko-KR" dirty="0" smtClean="0"/>
+              <a:t>Arduino UNO </a:t>
+            </a:r>
+            <a:r>
+              <a:rPr lang="en-US" altLang="ko-KR" dirty="0" err="1" smtClean="0"/>
+              <a:t>borad</a:t>
+            </a:r>
+            <a:endParaRPr lang="ko-KR" altLang="en-US" dirty="0"/>
           </a:p>
         </p:txBody>
       </p:sp>
     </p:spTree>
     <p:extLst>
       <p:ext uri="{BB962C8B-B14F-4D97-AF65-F5344CB8AC3E}">
-        <p14:creationId xmlns:p14="http://schemas.microsoft.com/office/powerpoint/2010/main" val="4099443769"/>
+        <p14:creationId xmlns:p14="http://schemas.microsoft.com/office/powerpoint/2010/main" val="1770829046"/>
       </p:ext>
     </p:extLst>
   </p:cSld>
@@ -6744,6 +7614,99 @@
           <a:chExt cx="0" cy="0"/>
         </a:xfrm>
       </p:grpSpPr>
+      <p:graphicFrame>
+        <p:nvGraphicFramePr>
+          <p:cNvPr id="7" name="다이어그램 6"/>
+          <p:cNvGraphicFramePr/>
+          <p:nvPr>
+            <p:extLst>
+              <p:ext uri="{D42A27DB-BD31-4B8C-83A1-F6EECF244321}">
+                <p14:modId xmlns:p14="http://schemas.microsoft.com/office/powerpoint/2010/main" val="4259525428"/>
+              </p:ext>
+            </p:extLst>
+          </p:nvPr>
+        </p:nvGraphicFramePr>
+        <p:xfrm>
+          <a:off x="838200" y="827346"/>
+          <a:ext cx="10835640" cy="5831036"/>
+        </p:xfrm>
+        <a:graphic>
+          <a:graphicData uri="http://schemas.openxmlformats.org/drawingml/2006/diagram">
+            <dgm:relIds xmlns:dgm="http://schemas.openxmlformats.org/drawingml/2006/diagram" xmlns:r="http://schemas.openxmlformats.org/officeDocument/2006/relationships" r:dm="rId2" r:lo="rId3" r:qs="rId4" r:cs="rId5"/>
+          </a:graphicData>
+        </a:graphic>
+      </p:graphicFrame>
+      <p:sp>
+        <p:nvSpPr>
+          <p:cNvPr id="2" name="제목 1"/>
+          <p:cNvSpPr>
+            <a:spLocks noGrp="1"/>
+          </p:cNvSpPr>
+          <p:nvPr>
+            <p:ph type="title"/>
+          </p:nvPr>
+        </p:nvSpPr>
+        <p:spPr>
+          <a:xfrm>
+            <a:off x="0" y="1"/>
+            <a:ext cx="9509760" cy="827346"/>
+          </a:xfrm>
+        </p:spPr>
+        <p:txBody>
+          <a:bodyPr>
+            <a:normAutofit/>
+          </a:bodyPr>
+          <a:lstStyle/>
+          <a:p>
+            <a:r>
+              <a:rPr lang="en-US" altLang="ko-KR" sz="3200" dirty="0" smtClean="0"/>
+              <a:t>  DB </a:t>
+            </a:r>
+            <a:r>
+              <a:rPr lang="ko-KR" altLang="en-US" sz="3200" dirty="0" smtClean="0"/>
+              <a:t>구성</a:t>
+            </a:r>
+            <a:endParaRPr lang="ko-KR" altLang="en-US" sz="3200" dirty="0"/>
+          </a:p>
+        </p:txBody>
+      </p:sp>
+    </p:spTree>
+    <p:extLst>
+      <p:ext uri="{BB962C8B-B14F-4D97-AF65-F5344CB8AC3E}">
+        <p14:creationId xmlns:p14="http://schemas.microsoft.com/office/powerpoint/2010/main" val="4099443769"/>
+      </p:ext>
+    </p:extLst>
+  </p:cSld>
+  <p:clrMapOvr>
+    <a:masterClrMapping/>
+  </p:clrMapOvr>
+  <p:timing>
+    <p:tnLst>
+      <p:par>
+        <p:cTn id="1" dur="indefinite" restart="never" nodeType="tmRoot"/>
+      </p:par>
+    </p:tnLst>
+  </p:timing>
+</p:sld>
+</file>
+
+<file path=ppt/slides/slide8.xml><?xml version="1.0" encoding="utf-8"?>
+<p:sld xmlns:a="http://schemas.openxmlformats.org/drawingml/2006/main" xmlns:r="http://schemas.openxmlformats.org/officeDocument/2006/relationships" xmlns:p="http://schemas.openxmlformats.org/presentationml/2006/main">
+  <p:cSld>
+    <p:spTree>
+      <p:nvGrpSpPr>
+        <p:cNvPr id="1" name=""/>
+        <p:cNvGrpSpPr/>
+        <p:nvPr/>
+      </p:nvGrpSpPr>
+      <p:grpSpPr>
+        <a:xfrm>
+          <a:off x="0" y="0"/>
+          <a:ext cx="0" cy="0"/>
+          <a:chOff x="0" y="0"/>
+          <a:chExt cx="0" cy="0"/>
+        </a:xfrm>
+      </p:grpSpPr>
       <p:sp>
         <p:nvSpPr>
           <p:cNvPr id="5" name="제목 1"/>
@@ -6799,7 +7762,15 @@
             </a:r>
             <a:r>
               <a:rPr lang="ko-KR" altLang="en-US" sz="3200" dirty="0" smtClean="0"/>
-              <a:t>재고 관리</a:t>
+              <a:t>제품 등록</a:t>
+            </a:r>
+            <a:r>
+              <a:rPr lang="en-US" altLang="ko-KR" sz="3200" dirty="0" smtClean="0"/>
+              <a:t>/</a:t>
+            </a:r>
+            <a:r>
+              <a:rPr lang="ko-KR" altLang="en-US" sz="3200" dirty="0" smtClean="0"/>
+              <a:t>조회</a:t>
             </a:r>
             <a:endParaRPr lang="ko-KR" altLang="en-US" sz="3200" dirty="0"/>
           </a:p>
@@ -7454,10 +8425,17 @@
   <p:clrMapOvr>
     <a:masterClrMapping/>
   </p:clrMapOvr>
+  <p:timing>
+    <p:tnLst>
+      <p:par>
+        <p:cTn id="1" dur="indefinite" restart="never" nodeType="tmRoot"/>
+      </p:par>
+    </p:tnLst>
+  </p:timing>
 </p:sld>
 </file>
 
-<file path=ppt/slides/slide8.xml><?xml version="1.0" encoding="utf-8"?>
+<file path=ppt/slides/slide9.xml><?xml version="1.0" encoding="utf-8"?>
 <p:sld xmlns:a="http://schemas.openxmlformats.org/drawingml/2006/main" xmlns:r="http://schemas.openxmlformats.org/officeDocument/2006/relationships" xmlns:p="http://schemas.openxmlformats.org/presentationml/2006/main">
   <p:cSld>
     <p:spTree>
@@ -8133,163 +9111,6 @@
     <p:extLst>
       <p:ext uri="{BB962C8B-B14F-4D97-AF65-F5344CB8AC3E}">
         <p14:creationId xmlns:p14="http://schemas.microsoft.com/office/powerpoint/2010/main" val="3773347036"/>
-      </p:ext>
-    </p:extLst>
-  </p:cSld>
-  <p:clrMapOvr>
-    <a:masterClrMapping/>
-  </p:clrMapOvr>
-</p:sld>
-</file>
-
-<file path=ppt/slides/slide9.xml><?xml version="1.0" encoding="utf-8"?>
-<p:sld xmlns:a="http://schemas.openxmlformats.org/drawingml/2006/main" xmlns:r="http://schemas.openxmlformats.org/officeDocument/2006/relationships" xmlns:p="http://schemas.openxmlformats.org/presentationml/2006/main">
-  <p:cSld>
-    <p:spTree>
-      <p:nvGrpSpPr>
-        <p:cNvPr id="1" name=""/>
-        <p:cNvGrpSpPr/>
-        <p:nvPr/>
-      </p:nvGrpSpPr>
-      <p:grpSpPr>
-        <a:xfrm>
-          <a:off x="0" y="0"/>
-          <a:ext cx="0" cy="0"/>
-          <a:chOff x="0" y="0"/>
-          <a:chExt cx="0" cy="0"/>
-        </a:xfrm>
-      </p:grpSpPr>
-      <p:sp>
-        <p:nvSpPr>
-          <p:cNvPr id="5" name="제목 1"/>
-          <p:cNvSpPr txBox="1">
-            <a:spLocks/>
-          </p:cNvSpPr>
-          <p:nvPr/>
-        </p:nvSpPr>
-        <p:spPr>
-          <a:xfrm>
-            <a:off x="0" y="1"/>
-            <a:ext cx="9509760" cy="827346"/>
-          </a:xfrm>
-          <a:prstGeom prst="rect">
-            <a:avLst/>
-          </a:prstGeom>
-        </p:spPr>
-        <p:txBody>
-          <a:bodyPr vert="horz" lIns="91440" tIns="45720" rIns="91440" bIns="45720" rtlCol="0" anchor="ctr">
-            <a:normAutofit/>
-          </a:bodyPr>
-          <a:lstStyle>
-            <a:lvl1pPr algn="l" defTabSz="914400" rtl="0" eaLnBrk="1" latinLnBrk="1" hangingPunct="1">
-              <a:lnSpc>
-                <a:spcPct val="90000"/>
-              </a:lnSpc>
-              <a:spcBef>
-                <a:spcPct val="0"/>
-              </a:spcBef>
-              <a:buNone/>
-              <a:defRPr sz="4400" kern="1200">
-                <a:solidFill>
-                  <a:schemeClr val="tx1"/>
-                </a:solidFill>
-                <a:latin typeface="+mj-lt"/>
-                <a:ea typeface="+mj-ea"/>
-                <a:cs typeface="+mj-cs"/>
-              </a:defRPr>
-            </a:lvl1pPr>
-          </a:lstStyle>
-          <a:p>
-            <a:r>
-              <a:rPr lang="en-US" altLang="ko-KR" sz="3200" dirty="0" smtClean="0"/>
-              <a:t>  UI </a:t>
-            </a:r>
-            <a:r>
-              <a:rPr lang="ko-KR" altLang="en-US" sz="3200" dirty="0" smtClean="0"/>
-              <a:t>설계 </a:t>
-            </a:r>
-            <a:r>
-              <a:rPr lang="en-US" altLang="ko-KR" sz="3200" dirty="0" smtClean="0"/>
-              <a:t>– </a:t>
-            </a:r>
-            <a:r>
-              <a:rPr lang="ko-KR" altLang="en-US" sz="3200" dirty="0" smtClean="0"/>
-              <a:t>장비 가동 시간</a:t>
-            </a:r>
-            <a:endParaRPr lang="ko-KR" altLang="en-US" sz="3200" dirty="0"/>
-          </a:p>
-        </p:txBody>
-      </p:sp>
-      <p:pic>
-        <p:nvPicPr>
-          <p:cNvPr id="2" name="그림 1"/>
-          <p:cNvPicPr>
-            <a:picLocks noChangeAspect="1"/>
-          </p:cNvPicPr>
-          <p:nvPr/>
-        </p:nvPicPr>
-        <p:blipFill>
-          <a:blip r:embed="rId2"/>
-          <a:stretch>
-            <a:fillRect/>
-          </a:stretch>
-        </p:blipFill>
-        <p:spPr>
-          <a:xfrm>
-            <a:off x="714808" y="827347"/>
-            <a:ext cx="10730432" cy="5633133"/>
-          </a:xfrm>
-          <a:prstGeom prst="rect">
-            <a:avLst/>
-          </a:prstGeom>
-        </p:spPr>
-      </p:pic>
-      <p:sp>
-        <p:nvSpPr>
-          <p:cNvPr id="4" name="TextBox 3"/>
-          <p:cNvSpPr txBox="1"/>
-          <p:nvPr/>
-        </p:nvSpPr>
-        <p:spPr>
-          <a:xfrm>
-            <a:off x="1158240" y="1280160"/>
-            <a:ext cx="3017173" cy="369332"/>
-          </a:xfrm>
-          <a:prstGeom prst="rect">
-            <a:avLst/>
-          </a:prstGeom>
-          <a:noFill/>
-        </p:spPr>
-        <p:txBody>
-          <a:bodyPr wrap="none" rtlCol="0">
-            <a:spAutoFit/>
-          </a:bodyPr>
-          <a:lstStyle/>
-          <a:p>
-            <a:r>
-              <a:rPr lang="en-US" altLang="ko-KR" dirty="0" smtClean="0"/>
-              <a:t>1) </a:t>
-            </a:r>
-            <a:r>
-              <a:rPr lang="ko-KR" altLang="en-US" dirty="0" smtClean="0"/>
-              <a:t>가동시간 탭 </a:t>
-            </a:r>
-            <a:r>
-              <a:rPr lang="ko-KR" altLang="en-US" dirty="0" err="1" smtClean="0"/>
-              <a:t>선택시</a:t>
-            </a:r>
-            <a:r>
-              <a:rPr lang="ko-KR" altLang="en-US" dirty="0" smtClean="0"/>
-              <a:t> 갱신</a:t>
-            </a:r>
-            <a:endParaRPr lang="ko-KR" altLang="en-US" dirty="0"/>
-          </a:p>
-        </p:txBody>
-      </p:sp>
-    </p:spTree>
-    <p:extLst>
-      <p:ext uri="{BB962C8B-B14F-4D97-AF65-F5344CB8AC3E}">
-        <p14:creationId xmlns:p14="http://schemas.microsoft.com/office/powerpoint/2010/main" val="1940417610"/>
       </p:ext>
     </p:extLst>
   </p:cSld>

</xml_diff>